<commit_message>
Added a document to study architecure + changes
</commit_message>
<xml_diff>
--- a/doc/design/Architecture Study.pptx
+++ b/doc/design/Architecture Study.pptx
@@ -6,8 +6,11 @@
   </p:sldMasterIdLst>
   <p:sldIdLst>
     <p:sldId id="256" r:id="rId2"/>
-    <p:sldId id="260" r:id="rId3"/>
-    <p:sldId id="259" r:id="rId4"/>
+    <p:sldId id="263" r:id="rId3"/>
+    <p:sldId id="260" r:id="rId4"/>
+    <p:sldId id="259" r:id="rId5"/>
+    <p:sldId id="261" r:id="rId6"/>
+    <p:sldId id="262" r:id="rId7"/>
   </p:sldIdLst>
   <p:sldSz cx="12192000" cy="6858000"/>
   <p:notesSz cx="6858000" cy="9144000"/>
@@ -3799,26 +3802,9 @@
   <p:cSld>
     <p:bg>
       <p:bgPr>
-        <a:gradFill rotWithShape="1">
-          <a:gsLst>
-            <a:gs pos="10000">
-              <a:schemeClr val="bg1">
-                <a:tint val="97000"/>
-                <a:hueMod val="92000"/>
-                <a:satMod val="169000"/>
-                <a:lumMod val="164000"/>
-              </a:schemeClr>
-            </a:gs>
-            <a:gs pos="100000">
-              <a:schemeClr val="bg1">
-                <a:shade val="96000"/>
-                <a:satMod val="120000"/>
-                <a:lumMod val="90000"/>
-              </a:schemeClr>
-            </a:gs>
-          </a:gsLst>
-          <a:lin ang="6120000" scaled="1"/>
-        </a:gradFill>
+        <a:solidFill>
+          <a:schemeClr val="bg1"/>
+        </a:solidFill>
         <a:effectLst/>
       </p:bgPr>
     </p:bg>
@@ -3836,6 +3822,66 @@
           <a:chExt cx="0" cy="0"/>
         </a:xfrm>
       </p:grpSpPr>
+      <p:sp useBgFill="1">
+        <p:nvSpPr>
+          <p:cNvPr id="14" name="Rectangle 8">
+            <a:extLst>
+              <a:ext uri="{FF2B5EF4-FFF2-40B4-BE49-F238E27FC236}">
+                <a16:creationId xmlns:a16="http://schemas.microsoft.com/office/drawing/2014/main" id="{EB1836F0-F9E0-4D93-9BDD-7EEC6EA05F7B}"/>
+              </a:ext>
+              <a:ext uri="{C183D7F6-B498-43B3-948B-1728B52AA6E4}">
+                <adec:decorative xmlns:adec="http://schemas.microsoft.com/office/drawing/2017/decorative" val="1"/>
+              </a:ext>
+            </a:extLst>
+          </p:cNvPr>
+          <p:cNvSpPr>
+            <a:spLocks noGrp="1" noRot="1" noChangeAspect="1" noMove="1" noResize="1" noEditPoints="1" noAdjustHandles="1" noChangeArrowheads="1" noChangeShapeType="1" noTextEdit="1"/>
+          </p:cNvSpPr>
+          <p:nvPr>
+            <p:extLst>
+              <p:ext uri="{386F3935-93C4-4BCD-93E2-E3B085C9AB24}">
+                <p16:designElem xmlns:p16="http://schemas.microsoft.com/office/powerpoint/2015/main" val="1"/>
+              </p:ext>
+            </p:extLst>
+          </p:nvPr>
+        </p:nvSpPr>
+        <p:spPr>
+          <a:xfrm>
+            <a:off x="0" y="0"/>
+            <a:ext cx="12192001" cy="6334316"/>
+          </a:xfrm>
+          <a:prstGeom prst="rect">
+            <a:avLst/>
+          </a:prstGeom>
+          <a:ln>
+            <a:noFill/>
+          </a:ln>
+        </p:spPr>
+        <p:style>
+          <a:lnRef idx="2">
+            <a:schemeClr val="accent1">
+              <a:shade val="50000"/>
+            </a:schemeClr>
+          </a:lnRef>
+          <a:fillRef idx="1">
+            <a:schemeClr val="accent1"/>
+          </a:fillRef>
+          <a:effectRef idx="0">
+            <a:schemeClr val="accent1"/>
+          </a:effectRef>
+          <a:fontRef idx="minor">
+            <a:schemeClr val="lt1"/>
+          </a:fontRef>
+        </p:style>
+        <p:txBody>
+          <a:bodyPr rtlCol="0" anchor="ctr"/>
+          <a:lstStyle/>
+          <a:p>
+            <a:pPr algn="ctr"/>
+            <a:endParaRPr lang="en-US"/>
+          </a:p>
+        </p:txBody>
+      </p:sp>
       <p:sp>
         <p:nvSpPr>
           <p:cNvPr id="2" name="Title 1">
@@ -3854,8 +3900,8 @@
         </p:nvSpPr>
         <p:spPr>
           <a:xfrm>
-            <a:off x="684212" y="685799"/>
-            <a:ext cx="9678988" cy="3673474"/>
+            <a:off x="5289754" y="639097"/>
+            <a:ext cx="6253317" cy="3686015"/>
           </a:xfrm>
         </p:spPr>
         <p:txBody>
@@ -3865,56 +3911,214 @@
           <a:lstStyle/>
           <a:p>
             <a:r>
-              <a:rPr lang="en-US" sz="6000" dirty="0">
-                <a:solidFill>
-                  <a:schemeClr val="tx2"/>
-                </a:solidFill>
-              </a:rPr>
+              <a:rPr lang="en-US"/>
               <a:t>Architecture Study</a:t>
             </a:r>
           </a:p>
         </p:txBody>
       </p:sp>
-      <p:sp>
-        <p:nvSpPr>
-          <p:cNvPr id="3" name="Subtitle 2">
+      <p:pic>
+        <p:nvPicPr>
+          <p:cNvPr id="6" name="Graphic 5" descr="Database">
             <a:extLst>
               <a:ext uri="{FF2B5EF4-FFF2-40B4-BE49-F238E27FC236}">
-                <a16:creationId xmlns:a16="http://schemas.microsoft.com/office/drawing/2014/main" id="{92B6DF00-8E36-404D-9228-3783705F3971}"/>
+                <a16:creationId xmlns:a16="http://schemas.microsoft.com/office/drawing/2014/main" id="{93338747-0388-46A1-8E62-9E3ED3A31072}"/>
               </a:ext>
             </a:extLst>
           </p:cNvPr>
-          <p:cNvSpPr>
-            <a:spLocks noGrp="1"/>
-          </p:cNvSpPr>
-          <p:nvPr>
-            <p:ph type="subTitle" idx="1"/>
-          </p:nvPr>
-        </p:nvSpPr>
-        <p:spPr>
-          <a:xfrm>
-            <a:off x="684212" y="4648198"/>
-            <a:ext cx="7005742" cy="1143002"/>
-          </a:xfrm>
-        </p:spPr>
-        <p:txBody>
-          <a:bodyPr>
-            <a:normAutofit/>
-          </a:bodyPr>
-          <a:lstStyle/>
-          <a:p>
-            <a:r>
-              <a:rPr lang="en-US" dirty="0">
-                <a:solidFill>
-                  <a:schemeClr val="tx1">
-                    <a:alpha val="80000"/>
-                  </a:schemeClr>
-                </a:solidFill>
-              </a:rPr>
-              <a:t>Multi-tier or N-tier</a:t>
-            </a:r>
-          </a:p>
-        </p:txBody>
+          <p:cNvPicPr>
+            <a:picLocks noChangeAspect="1"/>
+          </p:cNvPicPr>
+          <p:nvPr/>
+        </p:nvPicPr>
+        <p:blipFill>
+          <a:blip r:embed="rId2">
+            <a:extLst>
+              <a:ext uri="{28A0092B-C50C-407E-A947-70E740481C1C}">
+                <a14:useLocalDpi xmlns:a14="http://schemas.microsoft.com/office/drawing/2010/main" val="0"/>
+              </a:ext>
+              <a:ext uri="{96DAC541-7B7A-43D3-8B79-37D633B846F1}">
+                <asvg:svgBlip xmlns:asvg="http://schemas.microsoft.com/office/drawing/2016/SVG/main" r:embed="rId3"/>
+              </a:ext>
+            </a:extLst>
+          </a:blip>
+          <a:stretch>
+            <a:fillRect/>
+          </a:stretch>
+        </p:blipFill>
+        <p:spPr>
+          <a:xfrm>
+            <a:off x="633999" y="1163529"/>
+            <a:ext cx="4001315" cy="4001315"/>
+          </a:xfrm>
+          <a:prstGeom prst="rect">
+            <a:avLst/>
+          </a:prstGeom>
+        </p:spPr>
+      </p:pic>
+      <p:cxnSp>
+        <p:nvCxnSpPr>
+          <p:cNvPr id="16" name="Straight Connector 10">
+            <a:extLst>
+              <a:ext uri="{FF2B5EF4-FFF2-40B4-BE49-F238E27FC236}">
+                <a16:creationId xmlns:a16="http://schemas.microsoft.com/office/drawing/2014/main" id="{7A49EFD3-A806-4D59-99F1-AA9AFAE4EF71}"/>
+              </a:ext>
+              <a:ext uri="{C183D7F6-B498-43B3-948B-1728B52AA6E4}">
+                <adec:decorative xmlns:adec="http://schemas.microsoft.com/office/drawing/2017/decorative" val="1"/>
+              </a:ext>
+            </a:extLst>
+          </p:cNvPr>
+          <p:cNvCxnSpPr>
+            <a:cxnSpLocks noGrp="1" noRot="1" noChangeAspect="1" noMove="1" noResize="1" noEditPoints="1" noAdjustHandles="1" noChangeArrowheads="1" noChangeShapeType="1"/>
+          </p:cNvCxnSpPr>
+          <p:nvPr>
+            <p:extLst>
+              <p:ext uri="{386F3935-93C4-4BCD-93E2-E3B085C9AB24}">
+                <p16:designElem xmlns:p16="http://schemas.microsoft.com/office/powerpoint/2015/main" val="1"/>
+              </p:ext>
+            </p:extLst>
+          </p:nvPr>
+        </p:nvCxnSpPr>
+        <p:spPr>
+          <a:xfrm>
+            <a:off x="5447071" y="4343400"/>
+            <a:ext cx="5636107" cy="0"/>
+          </a:xfrm>
+          <a:prstGeom prst="line">
+            <a:avLst/>
+          </a:prstGeom>
+          <a:ln w="6350">
+            <a:solidFill>
+              <a:schemeClr val="tx2">
+                <a:alpha val="90000"/>
+              </a:schemeClr>
+            </a:solidFill>
+          </a:ln>
+        </p:spPr>
+        <p:style>
+          <a:lnRef idx="1">
+            <a:schemeClr val="accent1"/>
+          </a:lnRef>
+          <a:fillRef idx="0">
+            <a:schemeClr val="accent1"/>
+          </a:fillRef>
+          <a:effectRef idx="0">
+            <a:schemeClr val="accent1"/>
+          </a:effectRef>
+          <a:fontRef idx="minor">
+            <a:schemeClr val="tx1"/>
+          </a:fontRef>
+        </p:style>
+      </p:cxnSp>
+      <p:sp>
+        <p:nvSpPr>
+          <p:cNvPr id="13" name="Rectangle 12">
+            <a:extLst>
+              <a:ext uri="{FF2B5EF4-FFF2-40B4-BE49-F238E27FC236}">
+                <a16:creationId xmlns:a16="http://schemas.microsoft.com/office/drawing/2014/main" id="{6D2F28D1-82F9-40FE-935C-85ECF7660D2D}"/>
+              </a:ext>
+              <a:ext uri="{C183D7F6-B498-43B3-948B-1728B52AA6E4}">
+                <adec:decorative xmlns:adec="http://schemas.microsoft.com/office/drawing/2017/decorative" val="1"/>
+              </a:ext>
+            </a:extLst>
+          </p:cNvPr>
+          <p:cNvSpPr>
+            <a:spLocks noGrp="1" noRot="1" noChangeAspect="1" noMove="1" noResize="1" noEditPoints="1" noAdjustHandles="1" noChangeArrowheads="1" noChangeShapeType="1" noTextEdit="1"/>
+          </p:cNvSpPr>
+          <p:nvPr>
+            <p:extLst>
+              <p:ext uri="{386F3935-93C4-4BCD-93E2-E3B085C9AB24}">
+                <p16:designElem xmlns:p16="http://schemas.microsoft.com/office/powerpoint/2015/main" val="1"/>
+              </p:ext>
+            </p:extLst>
+          </p:nvPr>
+        </p:nvSpPr>
+        <p:spPr>
+          <a:xfrm>
+            <a:off x="15" y="6334316"/>
+            <a:ext cx="12191985" cy="66484"/>
+          </a:xfrm>
+          <a:prstGeom prst="rect">
+            <a:avLst/>
+          </a:prstGeom>
+          <a:solidFill>
+            <a:schemeClr val="accent1"/>
+          </a:solidFill>
+          <a:ln>
+            <a:noFill/>
+          </a:ln>
+        </p:spPr>
+        <p:style>
+          <a:lnRef idx="2">
+            <a:schemeClr val="accent1">
+              <a:shade val="50000"/>
+            </a:schemeClr>
+          </a:lnRef>
+          <a:fillRef idx="1">
+            <a:schemeClr val="accent1"/>
+          </a:fillRef>
+          <a:effectRef idx="0">
+            <a:schemeClr val="accent1"/>
+          </a:effectRef>
+          <a:fontRef idx="minor">
+            <a:schemeClr val="lt1"/>
+          </a:fontRef>
+        </p:style>
+      </p:sp>
+      <p:sp>
+        <p:nvSpPr>
+          <p:cNvPr id="15" name="Rectangle 14">
+            <a:extLst>
+              <a:ext uri="{FF2B5EF4-FFF2-40B4-BE49-F238E27FC236}">
+                <a16:creationId xmlns:a16="http://schemas.microsoft.com/office/drawing/2014/main" id="{4B670E93-2F53-48FC-AB6C-E99E22D17F31}"/>
+              </a:ext>
+              <a:ext uri="{C183D7F6-B498-43B3-948B-1728B52AA6E4}">
+                <adec:decorative xmlns:adec="http://schemas.microsoft.com/office/drawing/2017/decorative" val="1"/>
+              </a:ext>
+            </a:extLst>
+          </p:cNvPr>
+          <p:cNvSpPr>
+            <a:spLocks noGrp="1" noRot="1" noChangeAspect="1" noMove="1" noResize="1" noEditPoints="1" noAdjustHandles="1" noChangeArrowheads="1" noChangeShapeType="1" noTextEdit="1"/>
+          </p:cNvSpPr>
+          <p:nvPr>
+            <p:extLst>
+              <p:ext uri="{386F3935-93C4-4BCD-93E2-E3B085C9AB24}">
+                <p16:designElem xmlns:p16="http://schemas.microsoft.com/office/powerpoint/2015/main" val="1"/>
+              </p:ext>
+            </p:extLst>
+          </p:nvPr>
+        </p:nvSpPr>
+        <p:spPr>
+          <a:xfrm>
+            <a:off x="1" y="6400800"/>
+            <a:ext cx="12192000" cy="457200"/>
+          </a:xfrm>
+          <a:prstGeom prst="rect">
+            <a:avLst/>
+          </a:prstGeom>
+          <a:solidFill>
+            <a:schemeClr val="accent2"/>
+          </a:solidFill>
+          <a:ln>
+            <a:noFill/>
+          </a:ln>
+        </p:spPr>
+        <p:style>
+          <a:lnRef idx="2">
+            <a:schemeClr val="accent1">
+              <a:shade val="50000"/>
+            </a:schemeClr>
+          </a:lnRef>
+          <a:fillRef idx="1">
+            <a:schemeClr val="accent1"/>
+          </a:fillRef>
+          <a:effectRef idx="0">
+            <a:schemeClr val="accent1"/>
+          </a:effectRef>
+          <a:fontRef idx="minor">
+            <a:schemeClr val="lt1"/>
+          </a:fontRef>
+        </p:style>
       </p:sp>
     </p:spTree>
     <p:extLst>
@@ -3924,7 +4128,7 @@
     </p:extLst>
   </p:cSld>
   <p:clrMapOvr>
-    <a:overrideClrMapping bg1="lt1" tx1="dk1" bg2="lt2" tx2="dk2" accent1="accent1" accent2="accent2" accent3="accent3" accent4="accent4" accent5="accent5" accent6="accent6" hlink="hlink" folHlink="folHlink"/>
+    <a:masterClrMapping/>
   </p:clrMapOvr>
 </p:sld>
 </file>
@@ -3934,26 +4138,9 @@
   <p:cSld>
     <p:bg>
       <p:bgPr>
-        <a:gradFill rotWithShape="1">
-          <a:gsLst>
-            <a:gs pos="10000">
-              <a:schemeClr val="bg1">
-                <a:tint val="97000"/>
-                <a:hueMod val="92000"/>
-                <a:satMod val="169000"/>
-                <a:lumMod val="164000"/>
-              </a:schemeClr>
-            </a:gs>
-            <a:gs pos="100000">
-              <a:schemeClr val="bg1">
-                <a:shade val="96000"/>
-                <a:satMod val="120000"/>
-                <a:lumMod val="90000"/>
-              </a:schemeClr>
-            </a:gs>
-          </a:gsLst>
-          <a:lin ang="6120000" scaled="1"/>
-        </a:gradFill>
+        <a:solidFill>
+          <a:schemeClr val="bg1"/>
+        </a:solidFill>
         <a:effectLst/>
       </p:bgPr>
     </p:bg>
@@ -3971,40 +4158,72 @@
           <a:chExt cx="0" cy="0"/>
         </a:xfrm>
       </p:grpSpPr>
-      <p:sp>
-        <p:nvSpPr>
-          <p:cNvPr id="19" name="Title 18">
+      <p:sp useBgFill="1">
+        <p:nvSpPr>
+          <p:cNvPr id="8" name="Rectangle 7">
             <a:extLst>
               <a:ext uri="{FF2B5EF4-FFF2-40B4-BE49-F238E27FC236}">
-                <a16:creationId xmlns:a16="http://schemas.microsoft.com/office/drawing/2014/main" id="{3E10C818-4BC2-4FD9-80C0-2551336A5BDD}"/>
+                <a16:creationId xmlns:a16="http://schemas.microsoft.com/office/drawing/2014/main" id="{8C6E698C-8155-4B8B-BDC9-B7299772B509}"/>
+              </a:ext>
+              <a:ext uri="{C183D7F6-B498-43B3-948B-1728B52AA6E4}">
+                <adec:decorative xmlns:adec="http://schemas.microsoft.com/office/drawing/2017/decorative" val="1"/>
               </a:ext>
             </a:extLst>
           </p:cNvPr>
           <p:cNvSpPr>
-            <a:spLocks noGrp="1"/>
-          </p:cNvSpPr>
-          <p:nvPr>
-            <p:ph type="title"/>
-          </p:nvPr>
-        </p:nvSpPr>
-        <p:spPr/>
-        <p:txBody>
-          <a:bodyPr/>
-          <a:lstStyle/>
-          <a:p>
-            <a:r>
-              <a:rPr lang="en-US" dirty="0"/>
-              <a:t>Basic Concepts</a:t>
-            </a:r>
-          </a:p>
-        </p:txBody>
-      </p:sp>
-      <p:sp>
-        <p:nvSpPr>
-          <p:cNvPr id="21" name="Content Placeholder 20">
+            <a:spLocks noGrp="1" noRot="1" noChangeAspect="1" noMove="1" noResize="1" noEditPoints="1" noAdjustHandles="1" noChangeArrowheads="1" noChangeShapeType="1" noTextEdit="1"/>
+          </p:cNvSpPr>
+          <p:nvPr>
+            <p:extLst>
+              <p:ext uri="{386F3935-93C4-4BCD-93E2-E3B085C9AB24}">
+                <p16:designElem xmlns:p16="http://schemas.microsoft.com/office/powerpoint/2015/main" val="1"/>
+              </p:ext>
+            </p:extLst>
+          </p:nvPr>
+        </p:nvSpPr>
+        <p:spPr>
+          <a:xfrm>
+            <a:off x="0" y="0"/>
+            <a:ext cx="12188952" cy="6858000"/>
+          </a:xfrm>
+          <a:prstGeom prst="rect">
+            <a:avLst/>
+          </a:prstGeom>
+          <a:ln>
+            <a:noFill/>
+          </a:ln>
+        </p:spPr>
+        <p:style>
+          <a:lnRef idx="2">
+            <a:schemeClr val="accent1">
+              <a:shade val="50000"/>
+            </a:schemeClr>
+          </a:lnRef>
+          <a:fillRef idx="1">
+            <a:schemeClr val="accent1"/>
+          </a:fillRef>
+          <a:effectRef idx="0">
+            <a:schemeClr val="accent1"/>
+          </a:effectRef>
+          <a:fontRef idx="minor">
+            <a:schemeClr val="lt1"/>
+          </a:fontRef>
+        </p:style>
+        <p:txBody>
+          <a:bodyPr rtlCol="0" anchor="ctr"/>
+          <a:lstStyle/>
+          <a:p>
+            <a:pPr algn="ctr"/>
+            <a:endParaRPr lang="en-US"/>
+          </a:p>
+        </p:txBody>
+      </p:sp>
+      <p:sp>
+        <p:nvSpPr>
+          <p:cNvPr id="2" name="Title 1">
             <a:extLst>
               <a:ext uri="{FF2B5EF4-FFF2-40B4-BE49-F238E27FC236}">
-                <a16:creationId xmlns:a16="http://schemas.microsoft.com/office/drawing/2014/main" id="{8C06658F-1E67-4D2D-8655-C485B7744D02}"/>
+                <a16:creationId xmlns:a16="http://schemas.microsoft.com/office/drawing/2014/main" id="{E9FC5997-A24C-4C5E-B1A5-CC5096E79434}"/>
               </a:ext>
             </a:extLst>
           </p:cNvPr>
@@ -4012,113 +4231,235 @@
             <a:spLocks noGrp="1"/>
           </p:cNvSpPr>
           <p:nvPr>
-            <p:ph idx="1"/>
-          </p:nvPr>
-        </p:nvSpPr>
-        <p:spPr/>
-        <p:txBody>
-          <a:bodyPr>
+            <p:ph type="ctrTitle"/>
+          </p:nvPr>
+        </p:nvSpPr>
+        <p:spPr>
+          <a:xfrm>
+            <a:off x="965201" y="643467"/>
+            <a:ext cx="6255026" cy="5054008"/>
+          </a:xfrm>
+        </p:spPr>
+        <p:txBody>
+          <a:bodyPr anchor="ctr">
             <a:normAutofit/>
           </a:bodyPr>
           <a:lstStyle/>
           <a:p>
-            <a:pPr marL="0" lvl="0" indent="0" eaLnBrk="0" fontAlgn="base" hangingPunct="0">
-              <a:lnSpc>
-                <a:spcPct val="100000"/>
-              </a:lnSpc>
-              <a:spcBef>
-                <a:spcPct val="0"/>
-              </a:spcBef>
-              <a:spcAft>
-                <a:spcPct val="0"/>
-              </a:spcAft>
-              <a:buClrTx/>
-              <a:buSzTx/>
-              <a:buNone/>
-            </a:pPr>
-            <a:r>
-              <a:rPr lang="en-US" altLang="en-US" dirty="0">
-                <a:solidFill>
-                  <a:srgbClr val="000000"/>
-                </a:solidFill>
-              </a:rPr>
-              <a:t>The QTcpSocket and QTcpServer classes can be used to implement TCP clients and servers.</a:t>
-            </a:r>
-            <a:r>
-              <a:rPr lang="en-US" altLang="en-US" dirty="0"/>
-              <a:t> TCP is a transport and stream oriented protocol.</a:t>
-            </a:r>
-          </a:p>
-          <a:p>
-            <a:r>
-              <a:rPr lang="en-US" dirty="0"/>
-              <a:t>The high-level protocols built on top of TCP are typically either line-oriented or block-oriented:</a:t>
-            </a:r>
-          </a:p>
-          <a:p>
-            <a:pPr marL="285750" indent="-285750">
-              <a:buFont typeface="Wingdings" panose="05000000000000000000" pitchFamily="2" charset="2"/>
-              <a:buChar char="Ø"/>
-            </a:pPr>
-            <a:r>
-              <a:rPr lang="en-US" dirty="0"/>
-              <a:t>Line-oriented protocols transfer data as lines of text, each terminated by a newline.</a:t>
-            </a:r>
-          </a:p>
-          <a:p>
-            <a:pPr marL="285750" indent="-285750">
-              <a:buFont typeface="Wingdings" panose="05000000000000000000" pitchFamily="2" charset="2"/>
-              <a:buChar char="Ø"/>
-            </a:pPr>
-            <a:r>
-              <a:rPr lang="en-US" dirty="0"/>
-              <a:t>Block-oriented protocols transfer data as binary data blocks. Each block consists of a size field followed by that much data.</a:t>
-            </a:r>
-          </a:p>
-          <a:p>
-            <a:r>
-              <a:rPr lang="en-US" dirty="0"/>
-              <a:t>QTcpSocket is indirectly derived from QIODevice (through QAbstractSocket), so it can be read from and written to using a QDataStream or a QTextStream.</a:t>
-            </a:r>
-          </a:p>
-          <a:p>
-            <a:endParaRPr lang="en-US" dirty="0"/>
-          </a:p>
-          <a:p>
-            <a:pPr marL="0" lvl="0" indent="0" eaLnBrk="0" fontAlgn="base" hangingPunct="0">
-              <a:lnSpc>
-                <a:spcPct val="100000"/>
-              </a:lnSpc>
-              <a:spcBef>
-                <a:spcPct val="0"/>
-              </a:spcBef>
-              <a:spcAft>
-                <a:spcPct val="0"/>
-              </a:spcAft>
-              <a:buClrTx/>
-              <a:buSzTx/>
-              <a:buNone/>
-            </a:pPr>
-            <a:endParaRPr lang="en-US" altLang="en-US" dirty="0">
-              <a:solidFill>
-                <a:schemeClr val="tx1"/>
-              </a:solidFill>
-            </a:endParaRPr>
-          </a:p>
-          <a:p>
-            <a:endParaRPr lang="en-US" dirty="0"/>
-          </a:p>
-        </p:txBody>
+            <a:pPr algn="r"/>
+            <a:r>
+              <a:rPr lang="en-US"/>
+              <a:t>Architecture Study</a:t>
+            </a:r>
+          </a:p>
+        </p:txBody>
+      </p:sp>
+      <p:sp>
+        <p:nvSpPr>
+          <p:cNvPr id="3" name="Subtitle 2">
+            <a:extLst>
+              <a:ext uri="{FF2B5EF4-FFF2-40B4-BE49-F238E27FC236}">
+                <a16:creationId xmlns:a16="http://schemas.microsoft.com/office/drawing/2014/main" id="{92B6DF00-8E36-404D-9228-3783705F3971}"/>
+              </a:ext>
+            </a:extLst>
+          </p:cNvPr>
+          <p:cNvSpPr>
+            <a:spLocks noGrp="1"/>
+          </p:cNvSpPr>
+          <p:nvPr>
+            <p:ph type="subTitle" idx="1"/>
+          </p:nvPr>
+        </p:nvSpPr>
+        <p:spPr>
+          <a:xfrm>
+            <a:off x="7870995" y="643467"/>
+            <a:ext cx="3341488" cy="5054008"/>
+          </a:xfrm>
+        </p:spPr>
+        <p:txBody>
+          <a:bodyPr anchor="ctr">
+            <a:normAutofit/>
+          </a:bodyPr>
+          <a:lstStyle/>
+          <a:p>
+            <a:r>
+              <a:rPr lang="en-US"/>
+              <a:t>Multi-tier or N-tier</a:t>
+            </a:r>
+          </a:p>
+        </p:txBody>
+      </p:sp>
+      <p:cxnSp>
+        <p:nvCxnSpPr>
+          <p:cNvPr id="10" name="Straight Connector 9">
+            <a:extLst>
+              <a:ext uri="{FF2B5EF4-FFF2-40B4-BE49-F238E27FC236}">
+                <a16:creationId xmlns:a16="http://schemas.microsoft.com/office/drawing/2014/main" id="{09525C9A-1972-4836-BA7A-706C946EF4DA}"/>
+              </a:ext>
+              <a:ext uri="{C183D7F6-B498-43B3-948B-1728B52AA6E4}">
+                <adec:decorative xmlns:adec="http://schemas.microsoft.com/office/drawing/2017/decorative" val="1"/>
+              </a:ext>
+            </a:extLst>
+          </p:cNvPr>
+          <p:cNvCxnSpPr>
+            <a:cxnSpLocks noGrp="1" noRot="1" noChangeAspect="1" noMove="1" noResize="1" noEditPoints="1" noAdjustHandles="1" noChangeArrowheads="1" noChangeShapeType="1"/>
+          </p:cNvCxnSpPr>
+          <p:nvPr>
+            <p:extLst>
+              <p:ext uri="{386F3935-93C4-4BCD-93E2-E3B085C9AB24}">
+                <p16:designElem xmlns:p16="http://schemas.microsoft.com/office/powerpoint/2015/main" val="1"/>
+              </p:ext>
+            </p:extLst>
+          </p:nvPr>
+        </p:nvCxnSpPr>
+        <p:spPr>
+          <a:xfrm>
+            <a:off x="7534656" y="1391367"/>
+            <a:ext cx="0" cy="3558208"/>
+          </a:xfrm>
+          <a:prstGeom prst="line">
+            <a:avLst/>
+          </a:prstGeom>
+          <a:ln>
+            <a:solidFill>
+              <a:schemeClr val="tx2"/>
+            </a:solidFill>
+          </a:ln>
+        </p:spPr>
+        <p:style>
+          <a:lnRef idx="1">
+            <a:schemeClr val="accent1"/>
+          </a:lnRef>
+          <a:fillRef idx="0">
+            <a:schemeClr val="accent1"/>
+          </a:fillRef>
+          <a:effectRef idx="0">
+            <a:schemeClr val="accent1"/>
+          </a:effectRef>
+          <a:fontRef idx="minor">
+            <a:schemeClr val="tx1"/>
+          </a:fontRef>
+        </p:style>
+      </p:cxnSp>
+      <p:sp>
+        <p:nvSpPr>
+          <p:cNvPr id="12" name="Rectangle 11">
+            <a:extLst>
+              <a:ext uri="{FF2B5EF4-FFF2-40B4-BE49-F238E27FC236}">
+                <a16:creationId xmlns:a16="http://schemas.microsoft.com/office/drawing/2014/main" id="{8A549DE7-671D-4575-AF43-858FD99981CF}"/>
+              </a:ext>
+              <a:ext uri="{C183D7F6-B498-43B3-948B-1728B52AA6E4}">
+                <adec:decorative xmlns:adec="http://schemas.microsoft.com/office/drawing/2017/decorative" val="1"/>
+              </a:ext>
+            </a:extLst>
+          </p:cNvPr>
+          <p:cNvSpPr>
+            <a:spLocks noGrp="1" noRot="1" noChangeAspect="1" noMove="1" noResize="1" noEditPoints="1" noAdjustHandles="1" noChangeArrowheads="1" noChangeShapeType="1" noTextEdit="1"/>
+          </p:cNvSpPr>
+          <p:nvPr>
+            <p:extLst>
+              <p:ext uri="{386F3935-93C4-4BCD-93E2-E3B085C9AB24}">
+                <p16:designElem xmlns:p16="http://schemas.microsoft.com/office/powerpoint/2015/main" val="1"/>
+              </p:ext>
+            </p:extLst>
+          </p:nvPr>
+        </p:nvSpPr>
+        <p:spPr>
+          <a:xfrm>
+            <a:off x="3175" y="6400800"/>
+            <a:ext cx="12188825" cy="457200"/>
+          </a:xfrm>
+          <a:prstGeom prst="rect">
+            <a:avLst/>
+          </a:prstGeom>
+          <a:solidFill>
+            <a:schemeClr val="accent2"/>
+          </a:solidFill>
+          <a:ln>
+            <a:noFill/>
+          </a:ln>
+        </p:spPr>
+        <p:style>
+          <a:lnRef idx="2">
+            <a:schemeClr val="accent1">
+              <a:shade val="50000"/>
+            </a:schemeClr>
+          </a:lnRef>
+          <a:fillRef idx="1">
+            <a:schemeClr val="accent1"/>
+          </a:fillRef>
+          <a:effectRef idx="0">
+            <a:schemeClr val="accent1"/>
+          </a:effectRef>
+          <a:fontRef idx="minor">
+            <a:schemeClr val="lt1"/>
+          </a:fontRef>
+        </p:style>
+      </p:sp>
+      <p:sp>
+        <p:nvSpPr>
+          <p:cNvPr id="14" name="Rectangle 13">
+            <a:extLst>
+              <a:ext uri="{FF2B5EF4-FFF2-40B4-BE49-F238E27FC236}">
+                <a16:creationId xmlns:a16="http://schemas.microsoft.com/office/drawing/2014/main" id="{C22D9B36-9BE7-472B-8808-7E0D6810738F}"/>
+              </a:ext>
+              <a:ext uri="{C183D7F6-B498-43B3-948B-1728B52AA6E4}">
+                <adec:decorative xmlns:adec="http://schemas.microsoft.com/office/drawing/2017/decorative" val="1"/>
+              </a:ext>
+            </a:extLst>
+          </p:cNvPr>
+          <p:cNvSpPr>
+            <a:spLocks noGrp="1" noRot="1" noChangeAspect="1" noMove="1" noResize="1" noEditPoints="1" noAdjustHandles="1" noChangeArrowheads="1" noChangeShapeType="1" noTextEdit="1"/>
+          </p:cNvSpPr>
+          <p:nvPr>
+            <p:extLst>
+              <p:ext uri="{386F3935-93C4-4BCD-93E2-E3B085C9AB24}">
+                <p16:designElem xmlns:p16="http://schemas.microsoft.com/office/powerpoint/2015/main" val="1"/>
+              </p:ext>
+            </p:extLst>
+          </p:nvPr>
+        </p:nvSpPr>
+        <p:spPr>
+          <a:xfrm>
+            <a:off x="15" y="6340942"/>
+            <a:ext cx="12188825" cy="64008"/>
+          </a:xfrm>
+          <a:prstGeom prst="rect">
+            <a:avLst/>
+          </a:prstGeom>
+          <a:solidFill>
+            <a:schemeClr val="accent1"/>
+          </a:solidFill>
+          <a:ln>
+            <a:noFill/>
+          </a:ln>
+        </p:spPr>
+        <p:style>
+          <a:lnRef idx="2">
+            <a:schemeClr val="accent1">
+              <a:shade val="50000"/>
+            </a:schemeClr>
+          </a:lnRef>
+          <a:fillRef idx="1">
+            <a:schemeClr val="accent1"/>
+          </a:fillRef>
+          <a:effectRef idx="0">
+            <a:schemeClr val="accent1"/>
+          </a:effectRef>
+          <a:fontRef idx="minor">
+            <a:schemeClr val="lt1"/>
+          </a:fontRef>
+        </p:style>
       </p:sp>
     </p:spTree>
     <p:extLst>
       <p:ext uri="{BB962C8B-B14F-4D97-AF65-F5344CB8AC3E}">
-        <p14:creationId xmlns:p14="http://schemas.microsoft.com/office/powerpoint/2010/main" val="419441538"/>
+        <p14:creationId xmlns:p14="http://schemas.microsoft.com/office/powerpoint/2010/main" val="1640058052"/>
       </p:ext>
     </p:extLst>
   </p:cSld>
   <p:clrMapOvr>
-    <a:overrideClrMapping bg1="lt1" tx1="dk1" bg2="lt2" tx2="dk2" accent1="accent1" accent2="accent2" accent3="accent3" accent4="accent4" accent5="accent5" accent6="accent6" hlink="hlink" folHlink="folHlink"/>
+    <a:masterClrMapping/>
   </p:clrMapOvr>
 </p:sld>
 </file>
@@ -4167,27 +4508,179 @@
       </p:grpSpPr>
       <p:sp>
         <p:nvSpPr>
-          <p:cNvPr id="4" name="Rectangle 3">
+          <p:cNvPr id="19" name="Title 18">
             <a:extLst>
               <a:ext uri="{FF2B5EF4-FFF2-40B4-BE49-F238E27FC236}">
-                <a16:creationId xmlns:a16="http://schemas.microsoft.com/office/drawing/2014/main" id="{AA0D4CFD-2E93-467B-8404-61AEAFF89FF2}"/>
+                <a16:creationId xmlns:a16="http://schemas.microsoft.com/office/drawing/2014/main" id="{3E10C818-4BC2-4FD9-80C0-2551336A5BDD}"/>
               </a:ext>
             </a:extLst>
           </p:cNvPr>
-          <p:cNvSpPr/>
-          <p:nvPr/>
-        </p:nvSpPr>
-        <p:spPr>
-          <a:xfrm>
-            <a:off x="3404380" y="365758"/>
-            <a:ext cx="2039815" cy="1420837"/>
+          <p:cNvSpPr>
+            <a:spLocks noGrp="1"/>
+          </p:cNvSpPr>
+          <p:nvPr>
+            <p:ph type="title"/>
+          </p:nvPr>
+        </p:nvSpPr>
+        <p:spPr/>
+        <p:txBody>
+          <a:bodyPr/>
+          <a:lstStyle/>
+          <a:p>
+            <a:r>
+              <a:rPr lang="en-US" dirty="0"/>
+              <a:t>Basic Concepts</a:t>
+            </a:r>
+          </a:p>
+        </p:txBody>
+      </p:sp>
+      <p:sp>
+        <p:nvSpPr>
+          <p:cNvPr id="21" name="Content Placeholder 20">
+            <a:extLst>
+              <a:ext uri="{FF2B5EF4-FFF2-40B4-BE49-F238E27FC236}">
+                <a16:creationId xmlns:a16="http://schemas.microsoft.com/office/drawing/2014/main" id="{8C06658F-1E67-4D2D-8655-C485B7744D02}"/>
+              </a:ext>
+            </a:extLst>
+          </p:cNvPr>
+          <p:cNvSpPr>
+            <a:spLocks noGrp="1"/>
+          </p:cNvSpPr>
+          <p:nvPr>
+            <p:ph idx="1"/>
+          </p:nvPr>
+        </p:nvSpPr>
+        <p:spPr>
+          <a:xfrm>
+            <a:off x="1097280" y="1845733"/>
+            <a:ext cx="10058400" cy="4428457"/>
+          </a:xfrm>
+        </p:spPr>
+        <p:txBody>
+          <a:bodyPr>
+            <a:normAutofit fontScale="92500"/>
+          </a:bodyPr>
+          <a:lstStyle/>
+          <a:p>
+            <a:pPr algn="just"/>
+            <a:r>
+              <a:rPr lang="en-US" dirty="0"/>
+              <a:t>N-tier architecture is also called multi-tier architecture because the software is engineered to have the processing, data management, and presentation functions physically and logically separated.  That means that these different functions are hosted on several machines or clusters, ensuring that services are provided without resources being shared and, as such, these services are delivered at top capacity.  The “N” in the name n-tier architecture refers to any number from 1.</a:t>
+            </a:r>
+          </a:p>
+          <a:p>
+            <a:pPr algn="just"/>
+            <a:r>
+              <a:rPr lang="en-US" dirty="0"/>
+              <a:t>Not only does your software gain from being able to get services at the best possible rate, but it’s also easier to manage.  This is because when you work on one section, the changes you make will not affect the other functions.  And if there is a problem, you can easily pinpoint where it originates.</a:t>
+            </a:r>
+          </a:p>
+          <a:p>
+            <a:pPr algn="just"/>
+            <a:r>
+              <a:rPr lang="en-US" dirty="0"/>
+              <a:t>N-tier architecture would involve dividing an application into three different tiers.  These would be the</a:t>
+            </a:r>
+          </a:p>
+          <a:p>
+            <a:pPr algn="just"/>
+            <a:r>
+              <a:rPr lang="en-US" dirty="0"/>
+              <a:t>logic tier,</a:t>
+            </a:r>
+          </a:p>
+          <a:p>
+            <a:pPr algn="just"/>
+            <a:r>
+              <a:rPr lang="en-US" dirty="0"/>
+              <a:t>the presentation tier, and</a:t>
+            </a:r>
+          </a:p>
+          <a:p>
+            <a:pPr algn="just"/>
+            <a:r>
+              <a:rPr lang="en-US" dirty="0"/>
+              <a:t>the data tier</a:t>
+            </a:r>
+          </a:p>
+          <a:p>
+            <a:pPr algn="just"/>
+            <a:endParaRPr lang="en-US" dirty="0"/>
+          </a:p>
+        </p:txBody>
+      </p:sp>
+    </p:spTree>
+    <p:extLst>
+      <p:ext uri="{BB962C8B-B14F-4D97-AF65-F5344CB8AC3E}">
+        <p14:creationId xmlns:p14="http://schemas.microsoft.com/office/powerpoint/2010/main" val="419441538"/>
+      </p:ext>
+    </p:extLst>
+  </p:cSld>
+  <p:clrMapOvr>
+    <a:overrideClrMapping bg1="lt1" tx1="dk1" bg2="lt2" tx2="dk2" accent1="accent1" accent2="accent2" accent3="accent3" accent4="accent4" accent5="accent5" accent6="accent6" hlink="hlink" folHlink="folHlink"/>
+  </p:clrMapOvr>
+</p:sld>
+</file>
+
+<file path=ppt/slides/slide4.xml><?xml version="1.0" encoding="utf-8"?>
+<p:sld xmlns:a="http://schemas.openxmlformats.org/drawingml/2006/main" xmlns:r="http://schemas.openxmlformats.org/officeDocument/2006/relationships" xmlns:p="http://schemas.openxmlformats.org/presentationml/2006/main">
+  <p:cSld>
+    <p:bg>
+      <p:bgPr>
+        <a:solidFill>
+          <a:schemeClr val="bg1"/>
+        </a:solidFill>
+        <a:effectLst/>
+      </p:bgPr>
+    </p:bg>
+    <p:spTree>
+      <p:nvGrpSpPr>
+        <p:cNvPr id="1" name=""/>
+        <p:cNvGrpSpPr/>
+        <p:nvPr/>
+      </p:nvGrpSpPr>
+      <p:grpSpPr>
+        <a:xfrm>
+          <a:off x="0" y="0"/>
+          <a:ext cx="0" cy="0"/>
+          <a:chOff x="0" y="0"/>
+          <a:chExt cx="0" cy="0"/>
+        </a:xfrm>
+      </p:grpSpPr>
+      <p:sp useBgFill="1">
+        <p:nvSpPr>
+          <p:cNvPr id="71" name="Rectangle 70">
+            <a:extLst>
+              <a:ext uri="{FF2B5EF4-FFF2-40B4-BE49-F238E27FC236}">
+                <a16:creationId xmlns:a16="http://schemas.microsoft.com/office/drawing/2014/main" id="{44C5A9E5-0F35-4AA6-AF26-B90A2D47BC43}"/>
+              </a:ext>
+              <a:ext uri="{C183D7F6-B498-43B3-948B-1728B52AA6E4}">
+                <adec:decorative xmlns:adec="http://schemas.microsoft.com/office/drawing/2017/decorative" val="1"/>
+              </a:ext>
+            </a:extLst>
+          </p:cNvPr>
+          <p:cNvSpPr>
+            <a:spLocks noGrp="1" noRot="1" noChangeAspect="1" noMove="1" noResize="1" noEditPoints="1" noAdjustHandles="1" noChangeArrowheads="1" noChangeShapeType="1" noTextEdit="1"/>
+          </p:cNvSpPr>
+          <p:nvPr>
+            <p:extLst>
+              <p:ext uri="{386F3935-93C4-4BCD-93E2-E3B085C9AB24}">
+                <p16:designElem xmlns:p16="http://schemas.microsoft.com/office/powerpoint/2015/main" val="1"/>
+              </p:ext>
+            </p:extLst>
+          </p:nvPr>
+        </p:nvSpPr>
+        <p:spPr>
+          <a:xfrm>
+            <a:off x="0" y="1"/>
+            <a:ext cx="12192000" cy="6857999"/>
           </a:xfrm>
           <a:prstGeom prst="rect">
             <a:avLst/>
           </a:prstGeom>
-          <a:solidFill>
-            <a:srgbClr val="0070C0"/>
-          </a:solidFill>
+          <a:ln>
+            <a:noFill/>
+          </a:ln>
         </p:spPr>
         <p:style>
           <a:lnRef idx="2">
@@ -4210,50 +4703,124 @@
           <a:lstStyle/>
           <a:p>
             <a:pPr algn="ctr"/>
-            <a:r>
-              <a:rPr lang="en-US" dirty="0"/>
-              <a:t>Server</a:t>
-            </a:r>
-          </a:p>
-          <a:p>
-            <a:pPr algn="ctr"/>
-            <a:r>
-              <a:rPr lang="en-US" dirty="0"/>
-              <a:t>(QTcpServer)</a:t>
-            </a:r>
-          </a:p>
-          <a:p>
-            <a:pPr algn="ctr"/>
-            <a:r>
-              <a:rPr lang="en-US" dirty="0"/>
-              <a:t>(QTcpSocket)</a:t>
-            </a:r>
-          </a:p>
-        </p:txBody>
-      </p:sp>
-      <p:sp>
-        <p:nvSpPr>
-          <p:cNvPr id="13" name="Rectangle 12">
+            <a:endParaRPr lang="en-US"/>
+          </a:p>
+        </p:txBody>
+      </p:sp>
+      <p:pic>
+        <p:nvPicPr>
+          <p:cNvPr id="2" name="Picture 1" descr="A close up of a sign&#10;&#10;Description generated with very high confidence">
             <a:extLst>
               <a:ext uri="{FF2B5EF4-FFF2-40B4-BE49-F238E27FC236}">
-                <a16:creationId xmlns:a16="http://schemas.microsoft.com/office/drawing/2014/main" id="{528C541E-9DFC-409D-8C70-E3C7B0574C00}"/>
+                <a16:creationId xmlns:a16="http://schemas.microsoft.com/office/drawing/2014/main" id="{02D2173E-F0A0-4B1B-9805-0D6D4D7E2639}"/>
               </a:ext>
             </a:extLst>
           </p:cNvPr>
-          <p:cNvSpPr/>
+          <p:cNvPicPr>
+            <a:picLocks noChangeAspect="1"/>
+          </p:cNvPicPr>
           <p:nvPr/>
-        </p:nvSpPr>
-        <p:spPr>
-          <a:xfrm>
-            <a:off x="6707932" y="365758"/>
-            <a:ext cx="2039815" cy="1420837"/>
+        </p:nvPicPr>
+        <p:blipFill>
+          <a:blip r:embed="rId2"/>
+          <a:stretch>
+            <a:fillRect/>
+          </a:stretch>
+        </p:blipFill>
+        <p:spPr>
+          <a:xfrm>
+            <a:off x="1970127" y="643467"/>
+            <a:ext cx="2638346" cy="5050225"/>
+          </a:xfrm>
+          <a:prstGeom prst="rect">
+            <a:avLst/>
+          </a:prstGeom>
+        </p:spPr>
+      </p:pic>
+      <p:pic>
+        <p:nvPicPr>
+          <p:cNvPr id="1026" name="Picture 2" descr="N-Tier Architecture">
+            <a:extLst>
+              <a:ext uri="{FF2B5EF4-FFF2-40B4-BE49-F238E27FC236}">
+                <a16:creationId xmlns:a16="http://schemas.microsoft.com/office/drawing/2014/main" id="{2EFF2596-B706-4A38-BF95-8DD97048448F}"/>
+              </a:ext>
+            </a:extLst>
+          </p:cNvPr>
+          <p:cNvPicPr>
+            <a:picLocks noChangeAspect="1" noChangeArrowheads="1"/>
+          </p:cNvPicPr>
+          <p:nvPr/>
+        </p:nvPicPr>
+        <p:blipFill>
+          <a:blip r:embed="rId3">
+            <a:extLst>
+              <a:ext uri="{28A0092B-C50C-407E-A947-70E740481C1C}">
+                <a14:useLocalDpi xmlns:a14="http://schemas.microsoft.com/office/drawing/2010/main" val="0"/>
+              </a:ext>
+            </a:extLst>
+          </a:blip>
+          <a:srcRect/>
+          <a:stretch>
+            <a:fillRect/>
+          </a:stretch>
+        </p:blipFill>
+        <p:spPr bwMode="auto">
+          <a:xfrm>
+            <a:off x="6256866" y="803866"/>
+            <a:ext cx="5291666" cy="4729426"/>
+          </a:xfrm>
+          <a:prstGeom prst="rect">
+            <a:avLst/>
+          </a:prstGeom>
+          <a:noFill/>
+          <a:extLst>
+            <a:ext uri="{909E8E84-426E-40DD-AFC4-6F175D3DCCD1}">
+              <a14:hiddenFill xmlns:a14="http://schemas.microsoft.com/office/drawing/2010/main">
+                <a:solidFill>
+                  <a:srgbClr val="FFFFFF"/>
+                </a:solidFill>
+              </a14:hiddenFill>
+            </a:ext>
+          </a:extLst>
+        </p:spPr>
+      </p:pic>
+      <p:sp>
+        <p:nvSpPr>
+          <p:cNvPr id="73" name="Rectangle 72">
+            <a:extLst>
+              <a:ext uri="{FF2B5EF4-FFF2-40B4-BE49-F238E27FC236}">
+                <a16:creationId xmlns:a16="http://schemas.microsoft.com/office/drawing/2014/main" id="{4D9DB69D-7E48-4FDF-806E-F0B4BF0053DD}"/>
+              </a:ext>
+              <a:ext uri="{C183D7F6-B498-43B3-948B-1728B52AA6E4}">
+                <adec:decorative xmlns:adec="http://schemas.microsoft.com/office/drawing/2017/decorative" val="1"/>
+              </a:ext>
+            </a:extLst>
+          </p:cNvPr>
+          <p:cNvSpPr>
+            <a:spLocks noGrp="1" noRot="1" noChangeAspect="1" noMove="1" noResize="1" noEditPoints="1" noAdjustHandles="1" noChangeArrowheads="1" noChangeShapeType="1" noTextEdit="1"/>
+          </p:cNvSpPr>
+          <p:nvPr>
+            <p:extLst>
+              <p:ext uri="{386F3935-93C4-4BCD-93E2-E3B085C9AB24}">
+                <p16:designElem xmlns:p16="http://schemas.microsoft.com/office/powerpoint/2015/main" val="1"/>
+              </p:ext>
+            </p:extLst>
+          </p:nvPr>
+        </p:nvSpPr>
+        <p:spPr>
+          <a:xfrm>
+            <a:off x="0" y="6334316"/>
+            <a:ext cx="12192001" cy="65998"/>
           </a:xfrm>
           <a:prstGeom prst="rect">
             <a:avLst/>
           </a:prstGeom>
           <a:solidFill>
-            <a:srgbClr val="0070C0"/>
+            <a:schemeClr val="accent1"/>
           </a:solidFill>
+          <a:ln>
+            <a:noFill/>
+          </a:ln>
         </p:spPr>
         <p:style>
           <a:lnRef idx="2">
@@ -4271,365 +4838,44 @@
             <a:schemeClr val="lt1"/>
           </a:fontRef>
         </p:style>
-        <p:txBody>
-          <a:bodyPr rtlCol="0" anchor="ctr"/>
-          <a:lstStyle/>
-          <a:p>
-            <a:pPr algn="ctr"/>
-            <a:r>
-              <a:rPr lang="en-US" dirty="0"/>
-              <a:t>Client</a:t>
-            </a:r>
-          </a:p>
-          <a:p>
-            <a:pPr algn="ctr"/>
-            <a:r>
-              <a:rPr lang="en-US" dirty="0"/>
-              <a:t>(QTcpSocket)</a:t>
-            </a:r>
-          </a:p>
-        </p:txBody>
-      </p:sp>
-      <p:cxnSp>
-        <p:nvCxnSpPr>
-          <p:cNvPr id="6" name="Straight Connector 5">
+      </p:sp>
+      <p:sp>
+        <p:nvSpPr>
+          <p:cNvPr id="75" name="Rectangle 74">
             <a:extLst>
               <a:ext uri="{FF2B5EF4-FFF2-40B4-BE49-F238E27FC236}">
-                <a16:creationId xmlns:a16="http://schemas.microsoft.com/office/drawing/2014/main" id="{B6BF3326-45FF-4643-BBA8-574E00433AEA}"/>
+                <a16:creationId xmlns:a16="http://schemas.microsoft.com/office/drawing/2014/main" id="{846BF69C-4724-4F8D-8EA6-1487E9C9C4FD}"/>
+              </a:ext>
+              <a:ext uri="{C183D7F6-B498-43B3-948B-1728B52AA6E4}">
+                <adec:decorative xmlns:adec="http://schemas.microsoft.com/office/drawing/2017/decorative" val="1"/>
               </a:ext>
             </a:extLst>
           </p:cNvPr>
-          <p:cNvCxnSpPr>
-            <a:cxnSpLocks/>
-            <a:stCxn id="4" idx="2"/>
-          </p:cNvCxnSpPr>
-          <p:nvPr/>
-        </p:nvCxnSpPr>
-        <p:spPr>
-          <a:xfrm flipH="1">
-            <a:off x="4398630" y="1786595"/>
-            <a:ext cx="25658" cy="4556817"/>
-          </a:xfrm>
-          <a:prstGeom prst="line">
-            <a:avLst/>
-          </a:prstGeom>
-        </p:spPr>
-        <p:style>
-          <a:lnRef idx="1">
-            <a:schemeClr val="dk1"/>
-          </a:lnRef>
-          <a:fillRef idx="0">
-            <a:schemeClr val="dk1"/>
-          </a:fillRef>
-          <a:effectRef idx="0">
-            <a:schemeClr val="dk1"/>
-          </a:effectRef>
-          <a:fontRef idx="minor">
-            <a:schemeClr val="tx1"/>
-          </a:fontRef>
-        </p:style>
-      </p:cxnSp>
-      <p:cxnSp>
-        <p:nvCxnSpPr>
-          <p:cNvPr id="9" name="Straight Connector 8">
-            <a:extLst>
-              <a:ext uri="{FF2B5EF4-FFF2-40B4-BE49-F238E27FC236}">
-                <a16:creationId xmlns:a16="http://schemas.microsoft.com/office/drawing/2014/main" id="{E14D160B-5A39-44FE-BAA2-366636282670}"/>
-              </a:ext>
-            </a:extLst>
-          </p:cNvPr>
-          <p:cNvCxnSpPr>
-            <a:cxnSpLocks/>
-            <a:stCxn id="13" idx="2"/>
-          </p:cNvCxnSpPr>
-          <p:nvPr/>
-        </p:nvCxnSpPr>
-        <p:spPr>
-          <a:xfrm>
-            <a:off x="7727840" y="1786595"/>
-            <a:ext cx="0" cy="4542749"/>
-          </a:xfrm>
-          <a:prstGeom prst="line">
-            <a:avLst/>
-          </a:prstGeom>
-        </p:spPr>
-        <p:style>
-          <a:lnRef idx="1">
-            <a:schemeClr val="dk1"/>
-          </a:lnRef>
-          <a:fillRef idx="0">
-            <a:schemeClr val="dk1"/>
-          </a:fillRef>
-          <a:effectRef idx="0">
-            <a:schemeClr val="dk1"/>
-          </a:effectRef>
-          <a:fontRef idx="minor">
-            <a:schemeClr val="tx1"/>
-          </a:fontRef>
-        </p:style>
-      </p:cxnSp>
-      <p:sp>
-        <p:nvSpPr>
-          <p:cNvPr id="21" name="Rectangle 20">
-            <a:extLst>
-              <a:ext uri="{FF2B5EF4-FFF2-40B4-BE49-F238E27FC236}">
-                <a16:creationId xmlns:a16="http://schemas.microsoft.com/office/drawing/2014/main" id="{1F4951D1-79CC-4430-BF68-387A7AB1B919}"/>
-              </a:ext>
-            </a:extLst>
-          </p:cNvPr>
-          <p:cNvSpPr/>
-          <p:nvPr/>
-        </p:nvSpPr>
-        <p:spPr>
-          <a:xfrm>
-            <a:off x="7784111" y="2030100"/>
-            <a:ext cx="2372829" cy="369332"/>
-          </a:xfrm>
-          <a:prstGeom prst="rect">
-            <a:avLst/>
-          </a:prstGeom>
-        </p:spPr>
-        <p:txBody>
-          <a:bodyPr wrap="none">
-            <a:spAutoFit/>
-          </a:bodyPr>
-          <a:lstStyle/>
-          <a:p>
-            <a:r>
-              <a:rPr lang="en-US" i="1" dirty="0">
-                <a:solidFill>
-                  <a:srgbClr val="C00000"/>
-                </a:solidFill>
-              </a:rPr>
-              <a:t>connectToHost(ip, port)</a:t>
-            </a:r>
-            <a:endParaRPr lang="en-US" dirty="0">
-              <a:solidFill>
-                <a:srgbClr val="C00000"/>
-              </a:solidFill>
-            </a:endParaRPr>
-          </a:p>
-        </p:txBody>
-      </p:sp>
-      <p:cxnSp>
-        <p:nvCxnSpPr>
-          <p:cNvPr id="32" name="Straight Connector 31">
-            <a:extLst>
-              <a:ext uri="{FF2B5EF4-FFF2-40B4-BE49-F238E27FC236}">
-                <a16:creationId xmlns:a16="http://schemas.microsoft.com/office/drawing/2014/main" id="{31654B54-DE83-4408-8E6C-33E10AC73E93}"/>
-              </a:ext>
-            </a:extLst>
-          </p:cNvPr>
-          <p:cNvCxnSpPr>
-            <a:cxnSpLocks/>
-          </p:cNvCxnSpPr>
-          <p:nvPr/>
-        </p:nvCxnSpPr>
-        <p:spPr>
-          <a:xfrm>
-            <a:off x="8032517" y="2440743"/>
-            <a:ext cx="0" cy="935503"/>
-          </a:xfrm>
-          <a:prstGeom prst="line">
-            <a:avLst/>
-          </a:prstGeom>
-        </p:spPr>
-        <p:style>
-          <a:lnRef idx="1">
-            <a:schemeClr val="accent1"/>
-          </a:lnRef>
-          <a:fillRef idx="0">
-            <a:schemeClr val="accent1"/>
-          </a:fillRef>
-          <a:effectRef idx="0">
-            <a:schemeClr val="accent1"/>
-          </a:effectRef>
-          <a:fontRef idx="minor">
-            <a:schemeClr val="tx1"/>
-          </a:fontRef>
-        </p:style>
-      </p:cxnSp>
-      <p:cxnSp>
-        <p:nvCxnSpPr>
-          <p:cNvPr id="34" name="Straight Arrow Connector 33">
-            <a:extLst>
-              <a:ext uri="{FF2B5EF4-FFF2-40B4-BE49-F238E27FC236}">
-                <a16:creationId xmlns:a16="http://schemas.microsoft.com/office/drawing/2014/main" id="{F8F4E44A-AE1D-4315-B54F-56783D605E23}"/>
-              </a:ext>
-            </a:extLst>
-          </p:cNvPr>
-          <p:cNvCxnSpPr>
-            <a:cxnSpLocks/>
-          </p:cNvCxnSpPr>
-          <p:nvPr/>
-        </p:nvCxnSpPr>
-        <p:spPr>
-          <a:xfrm>
-            <a:off x="8032517" y="2799470"/>
-            <a:ext cx="1814595" cy="0"/>
-          </a:xfrm>
-          <a:prstGeom prst="straightConnector1">
-            <a:avLst/>
-          </a:prstGeom>
-          <a:ln>
-            <a:tailEnd type="triangle"/>
-          </a:ln>
-        </p:spPr>
-        <p:style>
-          <a:lnRef idx="1">
-            <a:schemeClr val="accent1"/>
-          </a:lnRef>
-          <a:fillRef idx="0">
-            <a:schemeClr val="accent1"/>
-          </a:fillRef>
-          <a:effectRef idx="0">
-            <a:schemeClr val="accent1"/>
-          </a:effectRef>
-          <a:fontRef idx="minor">
-            <a:schemeClr val="tx1"/>
-          </a:fontRef>
-        </p:style>
-      </p:cxnSp>
-      <p:cxnSp>
-        <p:nvCxnSpPr>
-          <p:cNvPr id="36" name="Straight Arrow Connector 35">
-            <a:extLst>
-              <a:ext uri="{FF2B5EF4-FFF2-40B4-BE49-F238E27FC236}">
-                <a16:creationId xmlns:a16="http://schemas.microsoft.com/office/drawing/2014/main" id="{2451D7C4-1648-4844-A73D-D0C9658C42A8}"/>
-              </a:ext>
-            </a:extLst>
-          </p:cNvPr>
-          <p:cNvCxnSpPr>
-            <a:cxnSpLocks/>
-          </p:cNvCxnSpPr>
-          <p:nvPr/>
-        </p:nvCxnSpPr>
-        <p:spPr>
-          <a:xfrm>
-            <a:off x="8032517" y="3376246"/>
-            <a:ext cx="1814595" cy="0"/>
-          </a:xfrm>
-          <a:prstGeom prst="straightConnector1">
-            <a:avLst/>
-          </a:prstGeom>
-          <a:ln>
-            <a:tailEnd type="triangle"/>
-          </a:ln>
-        </p:spPr>
-        <p:style>
-          <a:lnRef idx="1">
-            <a:schemeClr val="accent1"/>
-          </a:lnRef>
-          <a:fillRef idx="0">
-            <a:schemeClr val="accent1"/>
-          </a:fillRef>
-          <a:effectRef idx="0">
-            <a:schemeClr val="accent1"/>
-          </a:effectRef>
-          <a:fontRef idx="minor">
-            <a:schemeClr val="tx1"/>
-          </a:fontRef>
-        </p:style>
-      </p:cxnSp>
-      <p:sp>
-        <p:nvSpPr>
-          <p:cNvPr id="37" name="Rectangle 36">
-            <a:extLst>
-              <a:ext uri="{FF2B5EF4-FFF2-40B4-BE49-F238E27FC236}">
-                <a16:creationId xmlns:a16="http://schemas.microsoft.com/office/drawing/2014/main" id="{A926ABEB-CB69-48CD-B0BE-7CE3FF1EB4B2}"/>
-              </a:ext>
-            </a:extLst>
-          </p:cNvPr>
-          <p:cNvSpPr/>
-          <p:nvPr/>
-        </p:nvSpPr>
-        <p:spPr>
-          <a:xfrm>
-            <a:off x="9847112" y="2614804"/>
-            <a:ext cx="1339534" cy="369332"/>
-          </a:xfrm>
-          <a:prstGeom prst="rect">
-            <a:avLst/>
-          </a:prstGeom>
-        </p:spPr>
-        <p:txBody>
-          <a:bodyPr wrap="none">
-            <a:spAutoFit/>
-          </a:bodyPr>
-          <a:lstStyle/>
-          <a:p>
-            <a:r>
-              <a:rPr lang="en-US" dirty="0">
-                <a:solidFill>
-                  <a:srgbClr val="00B050"/>
-                </a:solidFill>
-              </a:rPr>
-              <a:t>connected()</a:t>
-            </a:r>
-          </a:p>
-        </p:txBody>
-      </p:sp>
-      <p:sp>
-        <p:nvSpPr>
-          <p:cNvPr id="38" name="Rectangle 37">
-            <a:extLst>
-              <a:ext uri="{FF2B5EF4-FFF2-40B4-BE49-F238E27FC236}">
-                <a16:creationId xmlns:a16="http://schemas.microsoft.com/office/drawing/2014/main" id="{35078075-F71A-4B68-A4C6-917C7D03A95F}"/>
-              </a:ext>
-            </a:extLst>
-          </p:cNvPr>
-          <p:cNvSpPr/>
-          <p:nvPr/>
-        </p:nvSpPr>
-        <p:spPr>
-          <a:xfrm>
-            <a:off x="8510057" y="3020982"/>
-            <a:ext cx="3556230" cy="369332"/>
-          </a:xfrm>
-          <a:prstGeom prst="rect">
-            <a:avLst/>
-          </a:prstGeom>
-        </p:spPr>
-        <p:txBody>
-          <a:bodyPr wrap="none">
-            <a:spAutoFit/>
-          </a:bodyPr>
-          <a:lstStyle/>
-          <a:p>
-            <a:r>
-              <a:rPr lang="en-US" dirty="0">
-                <a:solidFill>
-                  <a:srgbClr val="00B050"/>
-                </a:solidFill>
-              </a:rPr>
-              <a:t>error(QAbstractSocket::SocketError)</a:t>
-            </a:r>
-          </a:p>
-        </p:txBody>
-      </p:sp>
-      <p:sp>
-        <p:nvSpPr>
-          <p:cNvPr id="41" name="Rectangle 40">
-            <a:extLst>
-              <a:ext uri="{FF2B5EF4-FFF2-40B4-BE49-F238E27FC236}">
-                <a16:creationId xmlns:a16="http://schemas.microsoft.com/office/drawing/2014/main" id="{48A00E77-3919-4B6F-8440-16C54BCC6C15}"/>
-              </a:ext>
-            </a:extLst>
-          </p:cNvPr>
-          <p:cNvSpPr/>
-          <p:nvPr/>
-        </p:nvSpPr>
-        <p:spPr>
-          <a:xfrm>
-            <a:off x="9954667" y="363976"/>
-            <a:ext cx="361357" cy="369326"/>
+          <p:cNvSpPr>
+            <a:spLocks noGrp="1" noRot="1" noChangeAspect="1" noMove="1" noResize="1" noEditPoints="1" noAdjustHandles="1" noChangeArrowheads="1" noChangeShapeType="1" noTextEdit="1"/>
+          </p:cNvSpPr>
+          <p:nvPr>
+            <p:extLst>
+              <p:ext uri="{386F3935-93C4-4BCD-93E2-E3B085C9AB24}">
+                <p16:designElem xmlns:p16="http://schemas.microsoft.com/office/powerpoint/2015/main" val="1"/>
+              </p:ext>
+            </p:extLst>
+          </p:nvPr>
+        </p:nvSpPr>
+        <p:spPr>
+          <a:xfrm>
+            <a:off x="1" y="6400800"/>
+            <a:ext cx="12192000" cy="457200"/>
           </a:xfrm>
           <a:prstGeom prst="rect">
             <a:avLst/>
           </a:prstGeom>
           <a:solidFill>
-            <a:srgbClr val="C00000"/>
+            <a:schemeClr val="accent2"/>
           </a:solidFill>
+          <a:ln>
+            <a:noFill/>
+          </a:ln>
         </p:spPr>
         <p:style>
           <a:lnRef idx="2">
@@ -4647,21 +4893,13 @@
             <a:schemeClr val="lt1"/>
           </a:fontRef>
         </p:style>
-        <p:txBody>
-          <a:bodyPr rtlCol="0" anchor="ctr"/>
-          <a:lstStyle/>
-          <a:p>
-            <a:pPr algn="ctr"/>
-            <a:endParaRPr lang="en-US"/>
-          </a:p>
-        </p:txBody>
-      </p:sp>
-      <p:sp>
-        <p:nvSpPr>
-          <p:cNvPr id="42" name="Rectangle 41">
+      </p:sp>
+      <p:sp>
+        <p:nvSpPr>
+          <p:cNvPr id="3" name="Arrow: Right 2">
             <a:extLst>
               <a:ext uri="{FF2B5EF4-FFF2-40B4-BE49-F238E27FC236}">
-                <a16:creationId xmlns:a16="http://schemas.microsoft.com/office/drawing/2014/main" id="{481F38A8-3D41-4E23-AE9F-0F22D18A0890}"/>
+                <a16:creationId xmlns:a16="http://schemas.microsoft.com/office/drawing/2014/main" id="{8F8B8684-0444-4425-905A-77C577278D1F}"/>
               </a:ext>
             </a:extLst>
           </p:cNvPr>
@@ -4670,15 +4908,12 @@
         </p:nvSpPr>
         <p:spPr>
           <a:xfrm>
-            <a:off x="9958925" y="853672"/>
-            <a:ext cx="361357" cy="369326"/>
-          </a:xfrm>
-          <a:prstGeom prst="rect">
+            <a:off x="4608473" y="2729132"/>
+            <a:ext cx="1326662" cy="454507"/>
+          </a:xfrm>
+          <a:prstGeom prst="rightArrow">
             <a:avLst/>
           </a:prstGeom>
-          <a:solidFill>
-            <a:srgbClr val="00B050"/>
-          </a:solidFill>
         </p:spPr>
         <p:style>
           <a:lnRef idx="2">
@@ -4705,1013 +4940,329 @@
           </a:p>
         </p:txBody>
       </p:sp>
-      <p:sp>
-        <p:nvSpPr>
-          <p:cNvPr id="43" name="Rectangle 42">
-            <a:extLst>
-              <a:ext uri="{FF2B5EF4-FFF2-40B4-BE49-F238E27FC236}">
-                <a16:creationId xmlns:a16="http://schemas.microsoft.com/office/drawing/2014/main" id="{52DA25D9-A4B0-4BA9-BA52-BE10AFBF8FD5}"/>
-              </a:ext>
-            </a:extLst>
-          </p:cNvPr>
-          <p:cNvSpPr/>
-          <p:nvPr/>
-        </p:nvSpPr>
-        <p:spPr>
-          <a:xfrm>
-            <a:off x="9954666" y="1385173"/>
-            <a:ext cx="361357" cy="369326"/>
-          </a:xfrm>
-          <a:prstGeom prst="rect">
-            <a:avLst/>
-          </a:prstGeom>
-          <a:solidFill>
-            <a:srgbClr val="FFC000"/>
-          </a:solidFill>
-        </p:spPr>
-        <p:style>
-          <a:lnRef idx="2">
-            <a:schemeClr val="accent1">
-              <a:shade val="50000"/>
-            </a:schemeClr>
-          </a:lnRef>
-          <a:fillRef idx="1">
-            <a:schemeClr val="accent1"/>
-          </a:fillRef>
-          <a:effectRef idx="0">
-            <a:schemeClr val="accent1"/>
-          </a:effectRef>
-          <a:fontRef idx="minor">
-            <a:schemeClr val="lt1"/>
-          </a:fontRef>
-        </p:style>
-        <p:txBody>
-          <a:bodyPr rtlCol="0" anchor="ctr"/>
-          <a:lstStyle/>
-          <a:p>
-            <a:pPr algn="ctr"/>
-            <a:endParaRPr lang="en-US"/>
-          </a:p>
-        </p:txBody>
-      </p:sp>
-      <p:sp>
-        <p:nvSpPr>
-          <p:cNvPr id="45" name="Rectangle 44">
-            <a:extLst>
-              <a:ext uri="{FF2B5EF4-FFF2-40B4-BE49-F238E27FC236}">
-                <a16:creationId xmlns:a16="http://schemas.microsoft.com/office/drawing/2014/main" id="{9C7F0FE8-D8ED-4B5D-BBFB-9B0F9907EC39}"/>
-              </a:ext>
-            </a:extLst>
-          </p:cNvPr>
-          <p:cNvSpPr/>
-          <p:nvPr/>
-        </p:nvSpPr>
-        <p:spPr>
-          <a:xfrm>
-            <a:off x="10619002" y="853672"/>
-            <a:ext cx="721672" cy="369332"/>
-          </a:xfrm>
-          <a:prstGeom prst="rect">
-            <a:avLst/>
-          </a:prstGeom>
-        </p:spPr>
-        <p:txBody>
-          <a:bodyPr wrap="none">
-            <a:spAutoFit/>
-          </a:bodyPr>
-          <a:lstStyle/>
-          <a:p>
-            <a:r>
-              <a:rPr lang="en-US" dirty="0"/>
-              <a:t>signal</a:t>
-            </a:r>
-          </a:p>
-        </p:txBody>
-      </p:sp>
-      <p:sp>
-        <p:nvSpPr>
-          <p:cNvPr id="46" name="Rectangle 45">
-            <a:extLst>
-              <a:ext uri="{FF2B5EF4-FFF2-40B4-BE49-F238E27FC236}">
-                <a16:creationId xmlns:a16="http://schemas.microsoft.com/office/drawing/2014/main" id="{2D991599-2037-4B9B-8516-02F67E46C6EF}"/>
-              </a:ext>
-            </a:extLst>
-          </p:cNvPr>
-          <p:cNvSpPr/>
-          <p:nvPr/>
-        </p:nvSpPr>
-        <p:spPr>
-          <a:xfrm>
-            <a:off x="10578635" y="363970"/>
-            <a:ext cx="970137" cy="369332"/>
-          </a:xfrm>
-          <a:prstGeom prst="rect">
-            <a:avLst/>
-          </a:prstGeom>
-        </p:spPr>
-        <p:txBody>
-          <a:bodyPr wrap="none">
-            <a:spAutoFit/>
-          </a:bodyPr>
-          <a:lstStyle/>
-          <a:p>
-            <a:r>
-              <a:rPr lang="en-US" dirty="0"/>
-              <a:t>function</a:t>
-            </a:r>
-          </a:p>
-        </p:txBody>
-      </p:sp>
-      <p:sp>
-        <p:nvSpPr>
-          <p:cNvPr id="47" name="Rectangle 46">
-            <a:extLst>
-              <a:ext uri="{FF2B5EF4-FFF2-40B4-BE49-F238E27FC236}">
-                <a16:creationId xmlns:a16="http://schemas.microsoft.com/office/drawing/2014/main" id="{44E38737-90C3-444B-9E99-76153C7FC2F7}"/>
-              </a:ext>
-            </a:extLst>
-          </p:cNvPr>
-          <p:cNvSpPr/>
-          <p:nvPr/>
-        </p:nvSpPr>
-        <p:spPr>
-          <a:xfrm>
-            <a:off x="10663043" y="1387064"/>
-            <a:ext cx="526106" cy="369332"/>
-          </a:xfrm>
-          <a:prstGeom prst="rect">
-            <a:avLst/>
-          </a:prstGeom>
-        </p:spPr>
-        <p:txBody>
-          <a:bodyPr wrap="none">
-            <a:spAutoFit/>
-          </a:bodyPr>
-          <a:lstStyle/>
-          <a:p>
-            <a:r>
-              <a:rPr lang="en-US" dirty="0"/>
-              <a:t>slot</a:t>
-            </a:r>
-          </a:p>
-        </p:txBody>
-      </p:sp>
-      <p:sp>
-        <p:nvSpPr>
-          <p:cNvPr id="48" name="Rectangle 47">
-            <a:extLst>
-              <a:ext uri="{FF2B5EF4-FFF2-40B4-BE49-F238E27FC236}">
-                <a16:creationId xmlns:a16="http://schemas.microsoft.com/office/drawing/2014/main" id="{AA0F41ED-AAC8-442E-BF2F-27C950CCCC83}"/>
-              </a:ext>
-            </a:extLst>
-          </p:cNvPr>
-          <p:cNvSpPr/>
-          <p:nvPr/>
-        </p:nvSpPr>
-        <p:spPr>
-          <a:xfrm>
-            <a:off x="9575412" y="217170"/>
-            <a:ext cx="2258069" cy="1786586"/>
-          </a:xfrm>
-          <a:prstGeom prst="rect">
-            <a:avLst/>
-          </a:prstGeom>
-          <a:noFill/>
-        </p:spPr>
-        <p:style>
-          <a:lnRef idx="2">
-            <a:schemeClr val="accent1">
-              <a:shade val="50000"/>
-            </a:schemeClr>
-          </a:lnRef>
-          <a:fillRef idx="1">
-            <a:schemeClr val="accent1"/>
-          </a:fillRef>
-          <a:effectRef idx="0">
-            <a:schemeClr val="accent1"/>
-          </a:effectRef>
-          <a:fontRef idx="minor">
-            <a:schemeClr val="lt1"/>
-          </a:fontRef>
-        </p:style>
-        <p:txBody>
-          <a:bodyPr rtlCol="0" anchor="ctr"/>
-          <a:lstStyle/>
-          <a:p>
-            <a:pPr algn="ctr"/>
-            <a:endParaRPr lang="en-US"/>
-          </a:p>
-        </p:txBody>
-      </p:sp>
-      <p:cxnSp>
-        <p:nvCxnSpPr>
-          <p:cNvPr id="50" name="Straight Connector 49">
-            <a:extLst>
-              <a:ext uri="{FF2B5EF4-FFF2-40B4-BE49-F238E27FC236}">
-                <a16:creationId xmlns:a16="http://schemas.microsoft.com/office/drawing/2014/main" id="{9DFBEA9E-2E71-4766-A60B-E3A215556B38}"/>
-              </a:ext>
-            </a:extLst>
-          </p:cNvPr>
-          <p:cNvCxnSpPr/>
-          <p:nvPr/>
-        </p:nvCxnSpPr>
-        <p:spPr>
-          <a:xfrm>
-            <a:off x="326047" y="3910818"/>
-            <a:ext cx="11319245" cy="0"/>
-          </a:xfrm>
-          <a:prstGeom prst="line">
-            <a:avLst/>
-          </a:prstGeom>
-          <a:ln>
-            <a:solidFill>
-              <a:schemeClr val="tx1"/>
-            </a:solidFill>
-          </a:ln>
-        </p:spPr>
-        <p:style>
-          <a:lnRef idx="1">
-            <a:schemeClr val="accent1"/>
-          </a:lnRef>
-          <a:fillRef idx="0">
-            <a:schemeClr val="accent1"/>
-          </a:fillRef>
-          <a:effectRef idx="0">
-            <a:schemeClr val="accent1"/>
-          </a:effectRef>
-          <a:fontRef idx="minor">
-            <a:schemeClr val="tx1"/>
-          </a:fontRef>
-        </p:style>
-      </p:cxnSp>
-      <p:cxnSp>
-        <p:nvCxnSpPr>
-          <p:cNvPr id="51" name="Straight Connector 50">
-            <a:extLst>
-              <a:ext uri="{FF2B5EF4-FFF2-40B4-BE49-F238E27FC236}">
-                <a16:creationId xmlns:a16="http://schemas.microsoft.com/office/drawing/2014/main" id="{D7465471-DB95-4C49-B6A3-586723558F44}"/>
-              </a:ext>
-            </a:extLst>
-          </p:cNvPr>
-          <p:cNvCxnSpPr/>
-          <p:nvPr/>
-        </p:nvCxnSpPr>
-        <p:spPr>
-          <a:xfrm>
-            <a:off x="283843" y="4935415"/>
-            <a:ext cx="11319245" cy="0"/>
-          </a:xfrm>
-          <a:prstGeom prst="line">
-            <a:avLst/>
-          </a:prstGeom>
-          <a:ln>
-            <a:solidFill>
-              <a:schemeClr val="tx1"/>
-            </a:solidFill>
-          </a:ln>
-        </p:spPr>
-        <p:style>
-          <a:lnRef idx="1">
-            <a:schemeClr val="accent1"/>
-          </a:lnRef>
-          <a:fillRef idx="0">
-            <a:schemeClr val="accent1"/>
-          </a:fillRef>
-          <a:effectRef idx="0">
-            <a:schemeClr val="accent1"/>
-          </a:effectRef>
-          <a:fontRef idx="minor">
-            <a:schemeClr val="tx1"/>
-          </a:fontRef>
-        </p:style>
-      </p:cxnSp>
-      <p:sp>
-        <p:nvSpPr>
-          <p:cNvPr id="52" name="Rectangle 51">
-            <a:extLst>
-              <a:ext uri="{FF2B5EF4-FFF2-40B4-BE49-F238E27FC236}">
-                <a16:creationId xmlns:a16="http://schemas.microsoft.com/office/drawing/2014/main" id="{29CD3C37-CAC4-4185-BE53-511C820B4D27}"/>
-              </a:ext>
-            </a:extLst>
-          </p:cNvPr>
-          <p:cNvSpPr/>
-          <p:nvPr/>
-        </p:nvSpPr>
-        <p:spPr>
-          <a:xfrm>
-            <a:off x="7786854" y="3541486"/>
-            <a:ext cx="3445751" cy="369332"/>
-          </a:xfrm>
-          <a:prstGeom prst="rect">
-            <a:avLst/>
-          </a:prstGeom>
-        </p:spPr>
-        <p:txBody>
-          <a:bodyPr wrap="none">
-            <a:spAutoFit/>
-          </a:bodyPr>
-          <a:lstStyle/>
-          <a:p>
-            <a:r>
-              <a:rPr lang="en-US" i="1" dirty="0">
-                <a:solidFill>
-                  <a:srgbClr val="C00000"/>
-                </a:solidFill>
-              </a:rPr>
-              <a:t>waitForConnected()</a:t>
-            </a:r>
-            <a:r>
-              <a:rPr lang="en-US" i="1" dirty="0">
-                <a:solidFill>
-                  <a:schemeClr val="tx1">
-                    <a:lumMod val="50000"/>
-                    <a:lumOff val="50000"/>
-                  </a:schemeClr>
-                </a:solidFill>
-              </a:rPr>
-              <a:t>{blocking call}</a:t>
-            </a:r>
-            <a:endParaRPr lang="en-US" dirty="0">
-              <a:solidFill>
-                <a:schemeClr val="tx1">
-                  <a:lumMod val="50000"/>
-                  <a:lumOff val="50000"/>
-                </a:schemeClr>
-              </a:solidFill>
-            </a:endParaRPr>
-          </a:p>
-        </p:txBody>
-      </p:sp>
-      <p:cxnSp>
-        <p:nvCxnSpPr>
-          <p:cNvPr id="53" name="Straight Connector 52">
-            <a:extLst>
-              <a:ext uri="{FF2B5EF4-FFF2-40B4-BE49-F238E27FC236}">
-                <a16:creationId xmlns:a16="http://schemas.microsoft.com/office/drawing/2014/main" id="{D01EB0B7-5B2C-4B85-9253-EB2945D30676}"/>
-              </a:ext>
-            </a:extLst>
-          </p:cNvPr>
-          <p:cNvCxnSpPr/>
-          <p:nvPr/>
-        </p:nvCxnSpPr>
-        <p:spPr>
-          <a:xfrm>
-            <a:off x="309767" y="5819335"/>
-            <a:ext cx="11319245" cy="0"/>
-          </a:xfrm>
-          <a:prstGeom prst="line">
-            <a:avLst/>
-          </a:prstGeom>
-          <a:ln>
-            <a:solidFill>
-              <a:schemeClr val="tx1"/>
-            </a:solidFill>
-          </a:ln>
-        </p:spPr>
-        <p:style>
-          <a:lnRef idx="1">
-            <a:schemeClr val="accent1"/>
-          </a:lnRef>
-          <a:fillRef idx="0">
-            <a:schemeClr val="accent1"/>
-          </a:fillRef>
-          <a:effectRef idx="0">
-            <a:schemeClr val="accent1"/>
-          </a:effectRef>
-          <a:fontRef idx="minor">
-            <a:schemeClr val="tx1"/>
-          </a:fontRef>
-        </p:style>
-      </p:cxnSp>
-      <p:sp>
-        <p:nvSpPr>
-          <p:cNvPr id="54" name="Rectangle 53">
-            <a:extLst>
-              <a:ext uri="{FF2B5EF4-FFF2-40B4-BE49-F238E27FC236}">
-                <a16:creationId xmlns:a16="http://schemas.microsoft.com/office/drawing/2014/main" id="{F3B06077-ABE7-4C4C-8B66-60D71C4EA018}"/>
-              </a:ext>
-            </a:extLst>
-          </p:cNvPr>
-          <p:cNvSpPr/>
-          <p:nvPr/>
-        </p:nvSpPr>
-        <p:spPr>
-          <a:xfrm>
-            <a:off x="7792360" y="5960012"/>
-            <a:ext cx="1576457" cy="369332"/>
-          </a:xfrm>
-          <a:prstGeom prst="rect">
-            <a:avLst/>
-          </a:prstGeom>
-        </p:spPr>
-        <p:txBody>
-          <a:bodyPr wrap="none">
-            <a:spAutoFit/>
-          </a:bodyPr>
-          <a:lstStyle/>
-          <a:p>
-            <a:r>
-              <a:rPr lang="en-US" dirty="0">
-                <a:solidFill>
-                  <a:srgbClr val="00B050"/>
-                </a:solidFill>
-              </a:rPr>
-              <a:t>disconnected()</a:t>
-            </a:r>
-          </a:p>
-        </p:txBody>
-      </p:sp>
-      <p:sp>
-        <p:nvSpPr>
-          <p:cNvPr id="55" name="Rectangle 54">
-            <a:extLst>
-              <a:ext uri="{FF2B5EF4-FFF2-40B4-BE49-F238E27FC236}">
-                <a16:creationId xmlns:a16="http://schemas.microsoft.com/office/drawing/2014/main" id="{AADC428C-25A0-4266-BECB-E583CAEA62C5}"/>
-              </a:ext>
-            </a:extLst>
-          </p:cNvPr>
-          <p:cNvSpPr/>
-          <p:nvPr/>
-        </p:nvSpPr>
-        <p:spPr>
-          <a:xfrm>
-            <a:off x="7823880" y="4208028"/>
-            <a:ext cx="1323760" cy="369332"/>
-          </a:xfrm>
-          <a:prstGeom prst="rect">
-            <a:avLst/>
-          </a:prstGeom>
-        </p:spPr>
-        <p:txBody>
-          <a:bodyPr wrap="none">
-            <a:spAutoFit/>
-          </a:bodyPr>
-          <a:lstStyle/>
-          <a:p>
-            <a:r>
-              <a:rPr lang="en-US" dirty="0">
-                <a:solidFill>
-                  <a:srgbClr val="00B050"/>
-                </a:solidFill>
-              </a:rPr>
-              <a:t>readyRead()</a:t>
-            </a:r>
-          </a:p>
-        </p:txBody>
-      </p:sp>
-      <p:sp>
-        <p:nvSpPr>
-          <p:cNvPr id="56" name="Rectangle 55">
-            <a:extLst>
-              <a:ext uri="{FF2B5EF4-FFF2-40B4-BE49-F238E27FC236}">
-                <a16:creationId xmlns:a16="http://schemas.microsoft.com/office/drawing/2014/main" id="{88978CD8-E24F-4998-AC4E-C4EDAC824239}"/>
-              </a:ext>
-            </a:extLst>
-          </p:cNvPr>
-          <p:cNvSpPr/>
-          <p:nvPr/>
-        </p:nvSpPr>
-        <p:spPr>
-          <a:xfrm>
-            <a:off x="7837372" y="5164069"/>
-            <a:ext cx="813749" cy="369332"/>
-          </a:xfrm>
-          <a:prstGeom prst="rect">
-            <a:avLst/>
-          </a:prstGeom>
-        </p:spPr>
-        <p:txBody>
-          <a:bodyPr wrap="none">
-            <a:spAutoFit/>
-          </a:bodyPr>
-          <a:lstStyle/>
-          <a:p>
-            <a:r>
-              <a:rPr lang="en-US" dirty="0">
-                <a:solidFill>
-                  <a:srgbClr val="C00000"/>
-                </a:solidFill>
-              </a:rPr>
-              <a:t>write()</a:t>
-            </a:r>
-          </a:p>
-        </p:txBody>
-      </p:sp>
-      <p:cxnSp>
-        <p:nvCxnSpPr>
-          <p:cNvPr id="58" name="Straight Arrow Connector 57">
-            <a:extLst>
-              <a:ext uri="{FF2B5EF4-FFF2-40B4-BE49-F238E27FC236}">
-                <a16:creationId xmlns:a16="http://schemas.microsoft.com/office/drawing/2014/main" id="{9A65BA0F-EC73-4D72-8267-96D29E9B1659}"/>
-              </a:ext>
-            </a:extLst>
-          </p:cNvPr>
-          <p:cNvCxnSpPr>
-            <a:stCxn id="54" idx="3"/>
-          </p:cNvCxnSpPr>
-          <p:nvPr/>
-        </p:nvCxnSpPr>
-        <p:spPr>
-          <a:xfrm>
-            <a:off x="9368817" y="6144678"/>
-            <a:ext cx="919355" cy="0"/>
-          </a:xfrm>
-          <a:prstGeom prst="straightConnector1">
-            <a:avLst/>
-          </a:prstGeom>
-          <a:ln>
-            <a:tailEnd type="triangle"/>
-          </a:ln>
-        </p:spPr>
-        <p:style>
-          <a:lnRef idx="1">
-            <a:schemeClr val="accent1"/>
-          </a:lnRef>
-          <a:fillRef idx="0">
-            <a:schemeClr val="accent1"/>
-          </a:fillRef>
-          <a:effectRef idx="0">
-            <a:schemeClr val="accent1"/>
-          </a:effectRef>
-          <a:fontRef idx="minor">
-            <a:schemeClr val="tx1"/>
-          </a:fontRef>
-        </p:style>
-      </p:cxnSp>
-      <p:sp>
-        <p:nvSpPr>
-          <p:cNvPr id="59" name="Rectangle 58">
-            <a:extLst>
-              <a:ext uri="{FF2B5EF4-FFF2-40B4-BE49-F238E27FC236}">
-                <a16:creationId xmlns:a16="http://schemas.microsoft.com/office/drawing/2014/main" id="{BBFFC5B7-3428-46A8-B05E-952E0E7599B4}"/>
-              </a:ext>
-            </a:extLst>
-          </p:cNvPr>
-          <p:cNvSpPr/>
-          <p:nvPr/>
-        </p:nvSpPr>
-        <p:spPr>
-          <a:xfrm>
-            <a:off x="10316023" y="5974080"/>
-            <a:ext cx="829073" cy="369332"/>
-          </a:xfrm>
-          <a:prstGeom prst="rect">
-            <a:avLst/>
-          </a:prstGeom>
-        </p:spPr>
-        <p:txBody>
-          <a:bodyPr wrap="none">
-            <a:spAutoFit/>
-          </a:bodyPr>
-          <a:lstStyle/>
-          <a:p>
-            <a:r>
-              <a:rPr lang="en-US" dirty="0">
-                <a:solidFill>
-                  <a:srgbClr val="C00000"/>
-                </a:solidFill>
-              </a:rPr>
-              <a:t>close()</a:t>
-            </a:r>
-            <a:endParaRPr lang="en-US" dirty="0"/>
-          </a:p>
-        </p:txBody>
-      </p:sp>
-      <p:sp>
-        <p:nvSpPr>
-          <p:cNvPr id="62" name="Rectangle 61">
-            <a:extLst>
-              <a:ext uri="{FF2B5EF4-FFF2-40B4-BE49-F238E27FC236}">
-                <a16:creationId xmlns:a16="http://schemas.microsoft.com/office/drawing/2014/main" id="{639B0E70-C534-4CE3-8B5D-DA2A29FFFE32}"/>
-              </a:ext>
-            </a:extLst>
-          </p:cNvPr>
-          <p:cNvSpPr/>
-          <p:nvPr/>
-        </p:nvSpPr>
-        <p:spPr>
-          <a:xfrm>
-            <a:off x="314526" y="2043888"/>
-            <a:ext cx="1516505" cy="369332"/>
-          </a:xfrm>
-          <a:prstGeom prst="rect">
-            <a:avLst/>
-          </a:prstGeom>
-        </p:spPr>
-        <p:txBody>
-          <a:bodyPr wrap="none">
-            <a:spAutoFit/>
-          </a:bodyPr>
-          <a:lstStyle/>
-          <a:p>
-            <a:r>
-              <a:rPr lang="en-US" dirty="0">
-                <a:solidFill>
-                  <a:srgbClr val="C00000"/>
-                </a:solidFill>
-              </a:rPr>
-              <a:t>listen(ip, port)</a:t>
-            </a:r>
-          </a:p>
-        </p:txBody>
-      </p:sp>
-      <p:cxnSp>
-        <p:nvCxnSpPr>
-          <p:cNvPr id="63" name="Straight Connector 62">
-            <a:extLst>
-              <a:ext uri="{FF2B5EF4-FFF2-40B4-BE49-F238E27FC236}">
-                <a16:creationId xmlns:a16="http://schemas.microsoft.com/office/drawing/2014/main" id="{9670A1AD-87B7-465C-B8AF-CDF2EA1A60DB}"/>
-              </a:ext>
-            </a:extLst>
-          </p:cNvPr>
-          <p:cNvCxnSpPr>
-            <a:cxnSpLocks/>
-          </p:cNvCxnSpPr>
-          <p:nvPr/>
-        </p:nvCxnSpPr>
-        <p:spPr>
-          <a:xfrm>
-            <a:off x="419551" y="2410262"/>
-            <a:ext cx="0" cy="356773"/>
-          </a:xfrm>
-          <a:prstGeom prst="line">
-            <a:avLst/>
-          </a:prstGeom>
-        </p:spPr>
-        <p:style>
-          <a:lnRef idx="1">
-            <a:schemeClr val="accent1"/>
-          </a:lnRef>
-          <a:fillRef idx="0">
-            <a:schemeClr val="accent1"/>
-          </a:fillRef>
-          <a:effectRef idx="0">
-            <a:schemeClr val="accent1"/>
-          </a:effectRef>
-          <a:fontRef idx="minor">
-            <a:schemeClr val="tx1"/>
-          </a:fontRef>
-        </p:style>
-      </p:cxnSp>
-      <p:cxnSp>
-        <p:nvCxnSpPr>
-          <p:cNvPr id="64" name="Straight Arrow Connector 63">
-            <a:extLst>
-              <a:ext uri="{FF2B5EF4-FFF2-40B4-BE49-F238E27FC236}">
-                <a16:creationId xmlns:a16="http://schemas.microsoft.com/office/drawing/2014/main" id="{3B476A20-B3A9-407D-A636-EC75F8C45CF5}"/>
-              </a:ext>
-            </a:extLst>
-          </p:cNvPr>
-          <p:cNvCxnSpPr>
-            <a:cxnSpLocks/>
-          </p:cNvCxnSpPr>
-          <p:nvPr/>
-        </p:nvCxnSpPr>
-        <p:spPr>
-          <a:xfrm>
-            <a:off x="419551" y="2768989"/>
-            <a:ext cx="1198234" cy="10605"/>
-          </a:xfrm>
-          <a:prstGeom prst="straightConnector1">
-            <a:avLst/>
-          </a:prstGeom>
-          <a:ln>
-            <a:tailEnd type="triangle"/>
-          </a:ln>
-        </p:spPr>
-        <p:style>
-          <a:lnRef idx="1">
-            <a:schemeClr val="accent1"/>
-          </a:lnRef>
-          <a:fillRef idx="0">
-            <a:schemeClr val="accent1"/>
-          </a:fillRef>
-          <a:effectRef idx="0">
-            <a:schemeClr val="accent1"/>
-          </a:effectRef>
-          <a:fontRef idx="minor">
-            <a:schemeClr val="tx1"/>
-          </a:fontRef>
-        </p:style>
-      </p:cxnSp>
-      <p:sp>
-        <p:nvSpPr>
-          <p:cNvPr id="70" name="Rectangle 69">
-            <a:extLst>
-              <a:ext uri="{FF2B5EF4-FFF2-40B4-BE49-F238E27FC236}">
-                <a16:creationId xmlns:a16="http://schemas.microsoft.com/office/drawing/2014/main" id="{1536430A-3A89-433E-A431-AE676B03C076}"/>
-              </a:ext>
-            </a:extLst>
-          </p:cNvPr>
-          <p:cNvSpPr/>
-          <p:nvPr/>
-        </p:nvSpPr>
-        <p:spPr>
-          <a:xfrm>
-            <a:off x="1694342" y="2582369"/>
-            <a:ext cx="1802545" cy="369332"/>
-          </a:xfrm>
-          <a:prstGeom prst="rect">
-            <a:avLst/>
-          </a:prstGeom>
-        </p:spPr>
-        <p:txBody>
-          <a:bodyPr wrap="none">
-            <a:spAutoFit/>
-          </a:bodyPr>
-          <a:lstStyle/>
-          <a:p>
-            <a:r>
-              <a:rPr lang="en-US" dirty="0">
-                <a:solidFill>
-                  <a:srgbClr val="00B050"/>
-                </a:solidFill>
-              </a:rPr>
-              <a:t>newConnection()</a:t>
-            </a:r>
-          </a:p>
-        </p:txBody>
-      </p:sp>
-      <p:cxnSp>
-        <p:nvCxnSpPr>
-          <p:cNvPr id="73" name="Straight Connector 72">
-            <a:extLst>
-              <a:ext uri="{FF2B5EF4-FFF2-40B4-BE49-F238E27FC236}">
-                <a16:creationId xmlns:a16="http://schemas.microsoft.com/office/drawing/2014/main" id="{D26B5577-E7B9-4AE8-B0B3-69C68A25D504}"/>
-              </a:ext>
-            </a:extLst>
-          </p:cNvPr>
-          <p:cNvCxnSpPr>
-            <a:cxnSpLocks/>
-          </p:cNvCxnSpPr>
-          <p:nvPr/>
-        </p:nvCxnSpPr>
-        <p:spPr>
-          <a:xfrm>
-            <a:off x="1535607" y="2908494"/>
-            <a:ext cx="16988" cy="492316"/>
-          </a:xfrm>
-          <a:prstGeom prst="line">
-            <a:avLst/>
-          </a:prstGeom>
-        </p:spPr>
-        <p:style>
-          <a:lnRef idx="1">
-            <a:schemeClr val="accent1"/>
-          </a:lnRef>
-          <a:fillRef idx="0">
-            <a:schemeClr val="accent1"/>
-          </a:fillRef>
-          <a:effectRef idx="0">
-            <a:schemeClr val="accent1"/>
-          </a:effectRef>
-          <a:fontRef idx="minor">
-            <a:schemeClr val="tx1"/>
-          </a:fontRef>
-        </p:style>
-      </p:cxnSp>
-      <p:cxnSp>
-        <p:nvCxnSpPr>
-          <p:cNvPr id="75" name="Straight Arrow Connector 74">
-            <a:extLst>
-              <a:ext uri="{FF2B5EF4-FFF2-40B4-BE49-F238E27FC236}">
-                <a16:creationId xmlns:a16="http://schemas.microsoft.com/office/drawing/2014/main" id="{69199E7B-2A81-4486-A427-EB3CEB38D85F}"/>
-              </a:ext>
-            </a:extLst>
-          </p:cNvPr>
-          <p:cNvCxnSpPr>
-            <a:cxnSpLocks/>
-          </p:cNvCxnSpPr>
-          <p:nvPr/>
-        </p:nvCxnSpPr>
-        <p:spPr>
-          <a:xfrm>
-            <a:off x="1552596" y="3400864"/>
-            <a:ext cx="393475" cy="0"/>
-          </a:xfrm>
-          <a:prstGeom prst="straightConnector1">
-            <a:avLst/>
-          </a:prstGeom>
-          <a:ln>
-            <a:tailEnd type="triangle"/>
-          </a:ln>
-        </p:spPr>
-        <p:style>
-          <a:lnRef idx="1">
-            <a:schemeClr val="accent1"/>
-          </a:lnRef>
-          <a:fillRef idx="0">
-            <a:schemeClr val="accent1"/>
-          </a:fillRef>
-          <a:effectRef idx="0">
-            <a:schemeClr val="accent1"/>
-          </a:effectRef>
-          <a:fontRef idx="minor">
-            <a:schemeClr val="tx1"/>
-          </a:fontRef>
-        </p:style>
-      </p:cxnSp>
-      <p:sp>
-        <p:nvSpPr>
-          <p:cNvPr id="76" name="Rectangle 75">
-            <a:extLst>
-              <a:ext uri="{FF2B5EF4-FFF2-40B4-BE49-F238E27FC236}">
-                <a16:creationId xmlns:a16="http://schemas.microsoft.com/office/drawing/2014/main" id="{C61A711E-E7B6-48F8-83F6-D967F10DA5E1}"/>
-              </a:ext>
-            </a:extLst>
-          </p:cNvPr>
-          <p:cNvSpPr/>
-          <p:nvPr/>
-        </p:nvSpPr>
-        <p:spPr>
-          <a:xfrm>
-            <a:off x="1945957" y="3172154"/>
-            <a:ext cx="2529219" cy="369332"/>
-          </a:xfrm>
-          <a:prstGeom prst="rect">
-            <a:avLst/>
-          </a:prstGeom>
-        </p:spPr>
-        <p:txBody>
-          <a:bodyPr wrap="none">
-            <a:spAutoFit/>
-          </a:bodyPr>
-          <a:lstStyle/>
-          <a:p>
-            <a:r>
-              <a:rPr lang="en-US" i="1" dirty="0">
-                <a:solidFill>
-                  <a:srgbClr val="C00000"/>
-                </a:solidFill>
-              </a:rPr>
-              <a:t>nextPendingConnection()</a:t>
-            </a:r>
-            <a:endParaRPr lang="en-US" dirty="0">
-              <a:solidFill>
-                <a:srgbClr val="C00000"/>
-              </a:solidFill>
-            </a:endParaRPr>
-          </a:p>
-        </p:txBody>
-      </p:sp>
-      <p:sp>
-        <p:nvSpPr>
-          <p:cNvPr id="77" name="Rectangle 76">
-            <a:extLst>
-              <a:ext uri="{FF2B5EF4-FFF2-40B4-BE49-F238E27FC236}">
-                <a16:creationId xmlns:a16="http://schemas.microsoft.com/office/drawing/2014/main" id="{C324ED38-4001-4E54-9663-E8C3B03B3150}"/>
-              </a:ext>
-            </a:extLst>
-          </p:cNvPr>
-          <p:cNvSpPr/>
-          <p:nvPr/>
-        </p:nvSpPr>
-        <p:spPr>
-          <a:xfrm>
-            <a:off x="1434801" y="4191612"/>
-            <a:ext cx="1323760" cy="369332"/>
-          </a:xfrm>
-          <a:prstGeom prst="rect">
-            <a:avLst/>
-          </a:prstGeom>
-        </p:spPr>
-        <p:txBody>
-          <a:bodyPr wrap="none">
-            <a:spAutoFit/>
-          </a:bodyPr>
-          <a:lstStyle/>
-          <a:p>
-            <a:r>
-              <a:rPr lang="en-US" dirty="0">
-                <a:solidFill>
-                  <a:srgbClr val="00B050"/>
-                </a:solidFill>
-              </a:rPr>
-              <a:t>readyRead()</a:t>
-            </a:r>
-          </a:p>
-        </p:txBody>
-      </p:sp>
-      <p:sp>
-        <p:nvSpPr>
-          <p:cNvPr id="78" name="Rectangle 77">
-            <a:extLst>
-              <a:ext uri="{FF2B5EF4-FFF2-40B4-BE49-F238E27FC236}">
-                <a16:creationId xmlns:a16="http://schemas.microsoft.com/office/drawing/2014/main" id="{D4C7315B-3409-41C4-BA91-4365D85F0DD1}"/>
-              </a:ext>
-            </a:extLst>
-          </p:cNvPr>
-          <p:cNvSpPr/>
-          <p:nvPr/>
-        </p:nvSpPr>
-        <p:spPr>
-          <a:xfrm>
-            <a:off x="1687442" y="5105449"/>
-            <a:ext cx="813749" cy="369332"/>
-          </a:xfrm>
-          <a:prstGeom prst="rect">
-            <a:avLst/>
-          </a:prstGeom>
-        </p:spPr>
-        <p:txBody>
-          <a:bodyPr wrap="none">
-            <a:spAutoFit/>
-          </a:bodyPr>
-          <a:lstStyle/>
-          <a:p>
-            <a:r>
-              <a:rPr lang="en-US" dirty="0">
-                <a:solidFill>
-                  <a:srgbClr val="C00000"/>
-                </a:solidFill>
-              </a:rPr>
-              <a:t>write()</a:t>
-            </a:r>
-          </a:p>
-        </p:txBody>
-      </p:sp>
-      <p:sp>
-        <p:nvSpPr>
-          <p:cNvPr id="79" name="TextBox 78">
-            <a:extLst>
-              <a:ext uri="{FF2B5EF4-FFF2-40B4-BE49-F238E27FC236}">
-                <a16:creationId xmlns:a16="http://schemas.microsoft.com/office/drawing/2014/main" id="{565C8887-9770-473D-AA9A-E83E8FB81A34}"/>
-              </a:ext>
-            </a:extLst>
-          </p:cNvPr>
-          <p:cNvSpPr txBox="1"/>
-          <p:nvPr/>
-        </p:nvSpPr>
-        <p:spPr>
-          <a:xfrm>
-            <a:off x="257819" y="3619524"/>
-            <a:ext cx="3139386" cy="369332"/>
-          </a:xfrm>
-          <a:prstGeom prst="rect">
-            <a:avLst/>
-          </a:prstGeom>
-          <a:noFill/>
-        </p:spPr>
-        <p:txBody>
-          <a:bodyPr wrap="none" rtlCol="0">
-            <a:spAutoFit/>
-          </a:bodyPr>
-          <a:lstStyle/>
-          <a:p>
-            <a:r>
-              <a:rPr lang="en-US" dirty="0">
-                <a:solidFill>
-                  <a:srgbClr val="C00000"/>
-                </a:solidFill>
-              </a:rPr>
-              <a:t>Note: Will generate QTcpSocket</a:t>
-            </a:r>
-          </a:p>
-        </p:txBody>
-      </p:sp>
-      <p:cxnSp>
-        <p:nvCxnSpPr>
-          <p:cNvPr id="81" name="Straight Arrow Connector 80">
-            <a:extLst>
-              <a:ext uri="{FF2B5EF4-FFF2-40B4-BE49-F238E27FC236}">
-                <a16:creationId xmlns:a16="http://schemas.microsoft.com/office/drawing/2014/main" id="{3F1AC8C4-E989-4EF3-AE34-6FD795244BE5}"/>
-              </a:ext>
-            </a:extLst>
-          </p:cNvPr>
-          <p:cNvCxnSpPr/>
-          <p:nvPr/>
-        </p:nvCxnSpPr>
-        <p:spPr>
-          <a:xfrm>
-            <a:off x="3210566" y="3541486"/>
-            <a:ext cx="0" cy="184666"/>
-          </a:xfrm>
-          <a:prstGeom prst="straightConnector1">
-            <a:avLst/>
-          </a:prstGeom>
-          <a:ln>
-            <a:tailEnd type="triangle"/>
-          </a:ln>
-        </p:spPr>
-        <p:style>
-          <a:lnRef idx="1">
-            <a:schemeClr val="accent1"/>
-          </a:lnRef>
-          <a:fillRef idx="0">
-            <a:schemeClr val="accent1"/>
-          </a:fillRef>
-          <a:effectRef idx="0">
-            <a:schemeClr val="accent1"/>
-          </a:effectRef>
-          <a:fontRef idx="minor">
-            <a:schemeClr val="tx1"/>
-          </a:fontRef>
-        </p:style>
-      </p:cxnSp>
     </p:spTree>
     <p:extLst>
       <p:ext uri="{BB962C8B-B14F-4D97-AF65-F5344CB8AC3E}">
         <p14:creationId xmlns:p14="http://schemas.microsoft.com/office/powerpoint/2010/main" val="4038426872"/>
+      </p:ext>
+    </p:extLst>
+  </p:cSld>
+  <p:clrMapOvr>
+    <a:masterClrMapping/>
+  </p:clrMapOvr>
+</p:sld>
+</file>
+
+<file path=ppt/slides/slide5.xml><?xml version="1.0" encoding="utf-8"?>
+<p:sld xmlns:a="http://schemas.openxmlformats.org/drawingml/2006/main" xmlns:r="http://schemas.openxmlformats.org/officeDocument/2006/relationships" xmlns:p="http://schemas.openxmlformats.org/presentationml/2006/main">
+  <p:cSld>
+    <p:bg>
+      <p:bgPr>
+        <a:gradFill rotWithShape="1">
+          <a:gsLst>
+            <a:gs pos="10000">
+              <a:schemeClr val="bg1">
+                <a:tint val="97000"/>
+                <a:hueMod val="92000"/>
+                <a:satMod val="169000"/>
+                <a:lumMod val="164000"/>
+              </a:schemeClr>
+            </a:gs>
+            <a:gs pos="100000">
+              <a:schemeClr val="bg1">
+                <a:shade val="96000"/>
+                <a:satMod val="120000"/>
+                <a:lumMod val="90000"/>
+              </a:schemeClr>
+            </a:gs>
+          </a:gsLst>
+          <a:lin ang="6120000" scaled="1"/>
+        </a:gradFill>
+        <a:effectLst/>
+      </p:bgPr>
+    </p:bg>
+    <p:spTree>
+      <p:nvGrpSpPr>
+        <p:cNvPr id="1" name=""/>
+        <p:cNvGrpSpPr/>
+        <p:nvPr/>
+      </p:nvGrpSpPr>
+      <p:grpSpPr>
+        <a:xfrm>
+          <a:off x="0" y="0"/>
+          <a:ext cx="0" cy="0"/>
+          <a:chOff x="0" y="0"/>
+          <a:chExt cx="0" cy="0"/>
+        </a:xfrm>
+      </p:grpSpPr>
+      <p:sp>
+        <p:nvSpPr>
+          <p:cNvPr id="19" name="Title 18">
+            <a:extLst>
+              <a:ext uri="{FF2B5EF4-FFF2-40B4-BE49-F238E27FC236}">
+                <a16:creationId xmlns:a16="http://schemas.microsoft.com/office/drawing/2014/main" id="{3E10C818-4BC2-4FD9-80C0-2551336A5BDD}"/>
+              </a:ext>
+            </a:extLst>
+          </p:cNvPr>
+          <p:cNvSpPr>
+            <a:spLocks noGrp="1"/>
+          </p:cNvSpPr>
+          <p:nvPr>
+            <p:ph type="title"/>
+          </p:nvPr>
+        </p:nvSpPr>
+        <p:spPr/>
+        <p:txBody>
+          <a:bodyPr/>
+          <a:lstStyle/>
+          <a:p>
+            <a:r>
+              <a:rPr lang="en-US" dirty="0"/>
+              <a:t>Benefits of N-Tier Architecture?</a:t>
+            </a:r>
+          </a:p>
+        </p:txBody>
+      </p:sp>
+      <p:sp>
+        <p:nvSpPr>
+          <p:cNvPr id="21" name="Content Placeholder 20">
+            <a:extLst>
+              <a:ext uri="{FF2B5EF4-FFF2-40B4-BE49-F238E27FC236}">
+                <a16:creationId xmlns:a16="http://schemas.microsoft.com/office/drawing/2014/main" id="{8C06658F-1E67-4D2D-8655-C485B7744D02}"/>
+              </a:ext>
+            </a:extLst>
+          </p:cNvPr>
+          <p:cNvSpPr>
+            <a:spLocks noGrp="1"/>
+          </p:cNvSpPr>
+          <p:nvPr>
+            <p:ph idx="1"/>
+          </p:nvPr>
+        </p:nvSpPr>
+        <p:spPr>
+          <a:xfrm>
+            <a:off x="1097280" y="1845733"/>
+            <a:ext cx="10058400" cy="4428457"/>
+          </a:xfrm>
+        </p:spPr>
+        <p:txBody>
+          <a:bodyPr>
+            <a:normAutofit fontScale="85000" lnSpcReduction="20000"/>
+          </a:bodyPr>
+          <a:lstStyle/>
+          <a:p>
+            <a:pPr algn="just"/>
+            <a:r>
+              <a:rPr lang="en-US" dirty="0"/>
+              <a:t>There are several benefits to using n-tier architecture for your software.  These are scalability, ease of management, flexibility, and security.</a:t>
+            </a:r>
+          </a:p>
+          <a:p>
+            <a:pPr algn="just"/>
+            <a:r>
+              <a:rPr lang="en-US" b="1" dirty="0"/>
+              <a:t>Secure:</a:t>
+            </a:r>
+            <a:r>
+              <a:rPr lang="en-US" dirty="0"/>
+              <a:t> You can secure each of the three tiers separately using different methods.</a:t>
+            </a:r>
+          </a:p>
+          <a:p>
+            <a:pPr algn="just"/>
+            <a:r>
+              <a:rPr lang="en-US" b="1" dirty="0"/>
+              <a:t>Easy to manage:</a:t>
+            </a:r>
+            <a:r>
+              <a:rPr lang="en-US" dirty="0"/>
+              <a:t> You can manage each tier separately, adding or modifying each tier without affecting the other tiers.</a:t>
+            </a:r>
+          </a:p>
+          <a:p>
+            <a:pPr algn="just"/>
+            <a:r>
+              <a:rPr lang="en-US" b="1" dirty="0"/>
+              <a:t>Scalable:</a:t>
+            </a:r>
+            <a:r>
+              <a:rPr lang="en-US" dirty="0"/>
+              <a:t> If you need to add more resources, you can do it per tier, without affecting the other tiers.</a:t>
+            </a:r>
+          </a:p>
+          <a:p>
+            <a:pPr algn="just"/>
+            <a:r>
+              <a:rPr lang="en-US" b="1" dirty="0"/>
+              <a:t>Flexible:</a:t>
+            </a:r>
+            <a:r>
+              <a:rPr lang="en-US" dirty="0"/>
+              <a:t> Apart from isolated scalability, you can also expand each tier in any manner that your requirements dictate.</a:t>
+            </a:r>
+          </a:p>
+          <a:p>
+            <a:pPr algn="just"/>
+            <a:r>
+              <a:rPr lang="en-US" b="1" dirty="0"/>
+              <a:t>More efficient development:</a:t>
+            </a:r>
+            <a:r>
+              <a:rPr lang="en-US" dirty="0"/>
+              <a:t> N-tier architecture is very friendly for development, as different teams may work on each tier.  This way, you can be sure the design and presentation professionals work on the presentation tier and the database experts work on the data tier.</a:t>
+            </a:r>
+          </a:p>
+          <a:p>
+            <a:pPr algn="just"/>
+            <a:r>
+              <a:rPr lang="en-US" b="1" dirty="0"/>
+              <a:t>Easy to add new features:</a:t>
+            </a:r>
+            <a:r>
+              <a:rPr lang="en-US" dirty="0"/>
+              <a:t> If you want to introduce a new feature, you can add it to the appropriate tier without affecting the other tiers.</a:t>
+            </a:r>
+          </a:p>
+          <a:p>
+            <a:pPr algn="just"/>
+            <a:r>
+              <a:rPr lang="en-US" b="1" dirty="0"/>
+              <a:t>Easy to reuse:</a:t>
+            </a:r>
+            <a:r>
+              <a:rPr lang="en-US" dirty="0"/>
+              <a:t> Because the application is divided into independent tiers, you can easily reuse each tier for other software projects.  For instance, if you want to use the same program, but for a different data set, you can just replicate the logic and presentation tiers and then create a new data tier.</a:t>
+            </a:r>
+          </a:p>
+          <a:p>
+            <a:pPr algn="just"/>
+            <a:endParaRPr lang="en-US" dirty="0"/>
+          </a:p>
+        </p:txBody>
+      </p:sp>
+    </p:spTree>
+    <p:extLst>
+      <p:ext uri="{BB962C8B-B14F-4D97-AF65-F5344CB8AC3E}">
+        <p14:creationId xmlns:p14="http://schemas.microsoft.com/office/powerpoint/2010/main" val="573832282"/>
+      </p:ext>
+    </p:extLst>
+  </p:cSld>
+  <p:clrMapOvr>
+    <a:overrideClrMapping bg1="lt1" tx1="dk1" bg2="lt2" tx2="dk2" accent1="accent1" accent2="accent2" accent3="accent3" accent4="accent4" accent5="accent5" accent6="accent6" hlink="hlink" folHlink="folHlink"/>
+  </p:clrMapOvr>
+</p:sld>
+</file>
+
+<file path=ppt/slides/slide6.xml><?xml version="1.0" encoding="utf-8"?>
+<p:sld xmlns:a="http://schemas.openxmlformats.org/drawingml/2006/main" xmlns:r="http://schemas.openxmlformats.org/officeDocument/2006/relationships" xmlns:p="http://schemas.openxmlformats.org/presentationml/2006/main">
+  <p:cSld>
+    <p:bg>
+      <p:bgPr>
+        <a:gradFill rotWithShape="1">
+          <a:gsLst>
+            <a:gs pos="10000">
+              <a:schemeClr val="bg1">
+                <a:tint val="97000"/>
+                <a:hueMod val="92000"/>
+                <a:satMod val="169000"/>
+                <a:lumMod val="164000"/>
+              </a:schemeClr>
+            </a:gs>
+            <a:gs pos="100000">
+              <a:schemeClr val="bg1">
+                <a:shade val="96000"/>
+                <a:satMod val="120000"/>
+                <a:lumMod val="90000"/>
+              </a:schemeClr>
+            </a:gs>
+          </a:gsLst>
+          <a:lin ang="6120000" scaled="1"/>
+        </a:gradFill>
+        <a:effectLst/>
+      </p:bgPr>
+    </p:bg>
+    <p:spTree>
+      <p:nvGrpSpPr>
+        <p:cNvPr id="1" name=""/>
+        <p:cNvGrpSpPr/>
+        <p:nvPr/>
+      </p:nvGrpSpPr>
+      <p:grpSpPr>
+        <a:xfrm>
+          <a:off x="0" y="0"/>
+          <a:ext cx="0" cy="0"/>
+          <a:chOff x="0" y="0"/>
+          <a:chExt cx="0" cy="0"/>
+        </a:xfrm>
+      </p:grpSpPr>
+      <p:sp>
+        <p:nvSpPr>
+          <p:cNvPr id="19" name="Title 18">
+            <a:extLst>
+              <a:ext uri="{FF2B5EF4-FFF2-40B4-BE49-F238E27FC236}">
+                <a16:creationId xmlns:a16="http://schemas.microsoft.com/office/drawing/2014/main" id="{3E10C818-4BC2-4FD9-80C0-2551336A5BDD}"/>
+              </a:ext>
+            </a:extLst>
+          </p:cNvPr>
+          <p:cNvSpPr>
+            <a:spLocks noGrp="1"/>
+          </p:cNvSpPr>
+          <p:nvPr>
+            <p:ph type="title"/>
+          </p:nvPr>
+        </p:nvSpPr>
+        <p:spPr/>
+        <p:txBody>
+          <a:bodyPr/>
+          <a:lstStyle/>
+          <a:p>
+            <a:r>
+              <a:rPr lang="en-US" dirty="0"/>
+              <a:t>Further Reading</a:t>
+            </a:r>
+          </a:p>
+        </p:txBody>
+      </p:sp>
+      <p:sp>
+        <p:nvSpPr>
+          <p:cNvPr id="21" name="Content Placeholder 20">
+            <a:extLst>
+              <a:ext uri="{FF2B5EF4-FFF2-40B4-BE49-F238E27FC236}">
+                <a16:creationId xmlns:a16="http://schemas.microsoft.com/office/drawing/2014/main" id="{8C06658F-1E67-4D2D-8655-C485B7744D02}"/>
+              </a:ext>
+            </a:extLst>
+          </p:cNvPr>
+          <p:cNvSpPr>
+            <a:spLocks noGrp="1"/>
+          </p:cNvSpPr>
+          <p:nvPr>
+            <p:ph idx="1"/>
+          </p:nvPr>
+        </p:nvSpPr>
+        <p:spPr>
+          <a:xfrm>
+            <a:off x="1097280" y="1845733"/>
+            <a:ext cx="10058400" cy="4428457"/>
+          </a:xfrm>
+        </p:spPr>
+        <p:txBody>
+          <a:bodyPr>
+            <a:normAutofit/>
+          </a:bodyPr>
+          <a:lstStyle/>
+          <a:p>
+            <a:pPr algn="just"/>
+            <a:r>
+              <a:rPr lang="en-US" dirty="0"/>
+              <a:t>https://stackify.com/n-tier-architecture/</a:t>
+            </a:r>
+          </a:p>
+        </p:txBody>
+      </p:sp>
+    </p:spTree>
+    <p:extLst>
+      <p:ext uri="{BB962C8B-B14F-4D97-AF65-F5344CB8AC3E}">
+        <p14:creationId xmlns:p14="http://schemas.microsoft.com/office/powerpoint/2010/main" val="95492811"/>
       </p:ext>
     </p:extLst>
   </p:cSld>

</xml_diff>